<commit_message>
Started work on polaroid photo design
</commit_message>
<xml_diff>
--- a/Website Plan.pptx
+++ b/Website Plan.pptx
@@ -109,6 +109,11 @@
       </a:defRPr>
     </a:lvl9pPr>
   </p:defaultTextStyle>
+  <p:extLst>
+    <p:ext uri="{EFAFB233-063F-42B5-8137-9DF3F51BA10A}">
+      <p15:sldGuideLst xmlns:p15="http://schemas.microsoft.com/office/powerpoint/2012/main"/>
+    </p:ext>
+  </p:extLst>
 </p:presentation>
 </file>
 
@@ -194,7 +199,7 @@
           <a:p>
             <a:fld id="{279819A7-F850-49EE-88F1-B8CD6FDC48BE}" type="datetimeFigureOut">
               <a:rPr lang="en-GB" smtClean="0"/>
-              <a:t>29/02/2024</a:t>
+              <a:t>07/03/2024</a:t>
             </a:fld>
             <a:endParaRPr lang="en-GB"/>
           </a:p>
@@ -1036,7 +1041,7 @@
           <a:p>
             <a:fld id="{CF78FF56-53FC-43BD-87F2-84749E92ACD4}" type="datetimeFigureOut">
               <a:rPr lang="en-GB" smtClean="0"/>
-              <a:t>29/02/2024</a:t>
+              <a:t>07/03/2024</a:t>
             </a:fld>
             <a:endParaRPr lang="en-GB"/>
           </a:p>
@@ -1206,7 +1211,7 @@
           <a:p>
             <a:fld id="{CF78FF56-53FC-43BD-87F2-84749E92ACD4}" type="datetimeFigureOut">
               <a:rPr lang="en-GB" smtClean="0"/>
-              <a:t>29/02/2024</a:t>
+              <a:t>07/03/2024</a:t>
             </a:fld>
             <a:endParaRPr lang="en-GB"/>
           </a:p>
@@ -1386,7 +1391,7 @@
           <a:p>
             <a:fld id="{CF78FF56-53FC-43BD-87F2-84749E92ACD4}" type="datetimeFigureOut">
               <a:rPr lang="en-GB" smtClean="0"/>
-              <a:t>29/02/2024</a:t>
+              <a:t>07/03/2024</a:t>
             </a:fld>
             <a:endParaRPr lang="en-GB"/>
           </a:p>
@@ -1556,7 +1561,7 @@
           <a:p>
             <a:fld id="{CF78FF56-53FC-43BD-87F2-84749E92ACD4}" type="datetimeFigureOut">
               <a:rPr lang="en-GB" smtClean="0"/>
-              <a:t>29/02/2024</a:t>
+              <a:t>07/03/2024</a:t>
             </a:fld>
             <a:endParaRPr lang="en-GB"/>
           </a:p>
@@ -1802,7 +1807,7 @@
           <a:p>
             <a:fld id="{CF78FF56-53FC-43BD-87F2-84749E92ACD4}" type="datetimeFigureOut">
               <a:rPr lang="en-GB" smtClean="0"/>
-              <a:t>29/02/2024</a:t>
+              <a:t>07/03/2024</a:t>
             </a:fld>
             <a:endParaRPr lang="en-GB"/>
           </a:p>
@@ -2034,7 +2039,7 @@
           <a:p>
             <a:fld id="{CF78FF56-53FC-43BD-87F2-84749E92ACD4}" type="datetimeFigureOut">
               <a:rPr lang="en-GB" smtClean="0"/>
-              <a:t>29/02/2024</a:t>
+              <a:t>07/03/2024</a:t>
             </a:fld>
             <a:endParaRPr lang="en-GB"/>
           </a:p>
@@ -2401,7 +2406,7 @@
           <a:p>
             <a:fld id="{CF78FF56-53FC-43BD-87F2-84749E92ACD4}" type="datetimeFigureOut">
               <a:rPr lang="en-GB" smtClean="0"/>
-              <a:t>29/02/2024</a:t>
+              <a:t>07/03/2024</a:t>
             </a:fld>
             <a:endParaRPr lang="en-GB"/>
           </a:p>
@@ -2519,7 +2524,7 @@
           <a:p>
             <a:fld id="{CF78FF56-53FC-43BD-87F2-84749E92ACD4}" type="datetimeFigureOut">
               <a:rPr lang="en-GB" smtClean="0"/>
-              <a:t>29/02/2024</a:t>
+              <a:t>07/03/2024</a:t>
             </a:fld>
             <a:endParaRPr lang="en-GB"/>
           </a:p>
@@ -2614,7 +2619,7 @@
           <a:p>
             <a:fld id="{CF78FF56-53FC-43BD-87F2-84749E92ACD4}" type="datetimeFigureOut">
               <a:rPr lang="en-GB" smtClean="0"/>
-              <a:t>29/02/2024</a:t>
+              <a:t>07/03/2024</a:t>
             </a:fld>
             <a:endParaRPr lang="en-GB"/>
           </a:p>
@@ -2891,7 +2896,7 @@
           <a:p>
             <a:fld id="{CF78FF56-53FC-43BD-87F2-84749E92ACD4}" type="datetimeFigureOut">
               <a:rPr lang="en-GB" smtClean="0"/>
-              <a:t>29/02/2024</a:t>
+              <a:t>07/03/2024</a:t>
             </a:fld>
             <a:endParaRPr lang="en-GB"/>
           </a:p>
@@ -3148,7 +3153,7 @@
           <a:p>
             <a:fld id="{CF78FF56-53FC-43BD-87F2-84749E92ACD4}" type="datetimeFigureOut">
               <a:rPr lang="en-GB" smtClean="0"/>
-              <a:t>29/02/2024</a:t>
+              <a:t>07/03/2024</a:t>
             </a:fld>
             <a:endParaRPr lang="en-GB"/>
           </a:p>
@@ -3361,7 +3366,7 @@
           <a:p>
             <a:fld id="{CF78FF56-53FC-43BD-87F2-84749E92ACD4}" type="datetimeFigureOut">
               <a:rPr lang="en-GB" smtClean="0"/>
-              <a:t>29/02/2024</a:t>
+              <a:t>07/03/2024</a:t>
             </a:fld>
             <a:endParaRPr lang="en-GB"/>
           </a:p>
@@ -5086,6 +5091,627 @@
           </a:p>
         </p:txBody>
       </p:sp>
+      <p:grpSp>
+        <p:nvGrpSpPr>
+          <p:cNvPr id="16" name="Group 15">
+            <a:extLst>
+              <a:ext uri="{FF2B5EF4-FFF2-40B4-BE49-F238E27FC236}">
+                <a16:creationId xmlns:a16="http://schemas.microsoft.com/office/drawing/2014/main" id="{5A9215D9-9257-7AAA-E398-11435190254F}"/>
+              </a:ext>
+            </a:extLst>
+          </p:cNvPr>
+          <p:cNvGrpSpPr/>
+          <p:nvPr/>
+        </p:nvGrpSpPr>
+        <p:grpSpPr>
+          <a:xfrm>
+            <a:off x="2741795" y="2266657"/>
+            <a:ext cx="1296124" cy="1693245"/>
+            <a:chOff x="439577" y="482382"/>
+            <a:chExt cx="3217971" cy="4203933"/>
+          </a:xfrm>
+        </p:grpSpPr>
+        <p:grpSp>
+          <p:nvGrpSpPr>
+            <p:cNvPr id="9" name="Group 8">
+              <a:extLst>
+                <a:ext uri="{FF2B5EF4-FFF2-40B4-BE49-F238E27FC236}">
+                  <a16:creationId xmlns:a16="http://schemas.microsoft.com/office/drawing/2014/main" id="{80DEA0D6-6324-AF80-D665-AA30ED319CEE}"/>
+                </a:ext>
+              </a:extLst>
+            </p:cNvPr>
+            <p:cNvGrpSpPr/>
+            <p:nvPr/>
+          </p:nvGrpSpPr>
+          <p:grpSpPr>
+            <a:xfrm rot="21083772">
+              <a:off x="839648" y="2526315"/>
+              <a:ext cx="1800000" cy="2160000"/>
+              <a:chOff x="963600" y="1652002"/>
+              <a:chExt cx="1800000" cy="2160000"/>
+            </a:xfrm>
+          </p:grpSpPr>
+          <p:sp>
+            <p:nvSpPr>
+              <p:cNvPr id="20" name="Rectangle 19">
+                <a:extLst>
+                  <a:ext uri="{FF2B5EF4-FFF2-40B4-BE49-F238E27FC236}">
+                    <a16:creationId xmlns:a16="http://schemas.microsoft.com/office/drawing/2014/main" id="{F765E22D-39E7-B079-2A09-E36302A15FFE}"/>
+                  </a:ext>
+                </a:extLst>
+              </p:cNvPr>
+              <p:cNvSpPr/>
+              <p:nvPr/>
+            </p:nvSpPr>
+            <p:spPr>
+              <a:xfrm>
+                <a:off x="963600" y="1652002"/>
+                <a:ext cx="1800000" cy="2160000"/>
+              </a:xfrm>
+              <a:prstGeom prst="rect">
+                <a:avLst/>
+              </a:prstGeom>
+              <a:solidFill>
+                <a:schemeClr val="bg1">
+                  <a:lumMod val="95000"/>
+                </a:schemeClr>
+              </a:solidFill>
+              <a:ln>
+                <a:solidFill>
+                  <a:schemeClr val="tx1"/>
+                </a:solidFill>
+              </a:ln>
+            </p:spPr>
+            <p:style>
+              <a:lnRef idx="2">
+                <a:schemeClr val="accent1">
+                  <a:shade val="15000"/>
+                </a:schemeClr>
+              </a:lnRef>
+              <a:fillRef idx="1">
+                <a:schemeClr val="accent1"/>
+              </a:fillRef>
+              <a:effectRef idx="0">
+                <a:schemeClr val="accent1"/>
+              </a:effectRef>
+              <a:fontRef idx="minor">
+                <a:schemeClr val="lt1"/>
+              </a:fontRef>
+            </p:style>
+            <p:txBody>
+              <a:bodyPr rtlCol="0" anchor="ctr"/>
+              <a:lstStyle/>
+              <a:p>
+                <a:pPr algn="ctr"/>
+                <a:endParaRPr lang="en-GB"/>
+              </a:p>
+            </p:txBody>
+          </p:sp>
+          <p:sp>
+            <p:nvSpPr>
+              <p:cNvPr id="21" name="Rectangle 20">
+                <a:extLst>
+                  <a:ext uri="{FF2B5EF4-FFF2-40B4-BE49-F238E27FC236}">
+                    <a16:creationId xmlns:a16="http://schemas.microsoft.com/office/drawing/2014/main" id="{F45B33CA-38B3-0F64-E0D2-C25C354D755A}"/>
+                  </a:ext>
+                </a:extLst>
+              </p:cNvPr>
+              <p:cNvSpPr/>
+              <p:nvPr/>
+            </p:nvSpPr>
+            <p:spPr>
+              <a:xfrm>
+                <a:off x="1071600" y="1763423"/>
+                <a:ext cx="1584000" cy="1584000"/>
+              </a:xfrm>
+              <a:prstGeom prst="rect">
+                <a:avLst/>
+              </a:prstGeom>
+            </p:spPr>
+            <p:style>
+              <a:lnRef idx="2">
+                <a:schemeClr val="accent1">
+                  <a:shade val="15000"/>
+                </a:schemeClr>
+              </a:lnRef>
+              <a:fillRef idx="1">
+                <a:schemeClr val="accent1"/>
+              </a:fillRef>
+              <a:effectRef idx="0">
+                <a:schemeClr val="accent1"/>
+              </a:effectRef>
+              <a:fontRef idx="minor">
+                <a:schemeClr val="lt1"/>
+              </a:fontRef>
+            </p:style>
+            <p:txBody>
+              <a:bodyPr rtlCol="0" anchor="ctr"/>
+              <a:lstStyle/>
+              <a:p>
+                <a:pPr algn="ctr"/>
+                <a:endParaRPr lang="en-GB"/>
+              </a:p>
+            </p:txBody>
+          </p:sp>
+          <p:sp>
+            <p:nvSpPr>
+              <p:cNvPr id="22" name="TextBox 21">
+                <a:extLst>
+                  <a:ext uri="{FF2B5EF4-FFF2-40B4-BE49-F238E27FC236}">
+                    <a16:creationId xmlns:a16="http://schemas.microsoft.com/office/drawing/2014/main" id="{CC013935-C167-9CF8-462C-813008491A28}"/>
+                  </a:ext>
+                </a:extLst>
+              </p:cNvPr>
+              <p:cNvSpPr txBox="1"/>
+              <p:nvPr/>
+            </p:nvSpPr>
+            <p:spPr>
+              <a:xfrm>
+                <a:off x="1071600" y="3439720"/>
+                <a:ext cx="1583999" cy="246291"/>
+              </a:xfrm>
+              <a:prstGeom prst="rect">
+                <a:avLst/>
+              </a:prstGeom>
+              <a:noFill/>
+            </p:spPr>
+            <p:txBody>
+              <a:bodyPr wrap="square" rtlCol="0" anchor="ctr">
+                <a:spAutoFit/>
+              </a:bodyPr>
+              <a:lstStyle/>
+              <a:p>
+                <a:pPr algn="ctr"/>
+                <a:r>
+                  <a:rPr lang="en-GB" sz="400" b="1" dirty="0" err="1"/>
+                  <a:t>Scia</a:t>
+                </a:r>
+                <a:r>
+                  <a:rPr lang="en-GB" sz="400" b="1" dirty="0"/>
+                  <a:t> </a:t>
+                </a:r>
+                <a:r>
+                  <a:rPr lang="en-GB" sz="400" b="1" dirty="0" err="1"/>
+                  <a:t>ra</a:t>
+                </a:r>
+                <a:r>
+                  <a:rPr lang="en-GB" sz="400" b="1" dirty="0"/>
+                  <a:t> </a:t>
+                </a:r>
+                <a:r>
+                  <a:rPr lang="en-GB" sz="400" b="1" dirty="0" err="1"/>
+                  <a:t>aigpmb</a:t>
+                </a:r>
+                <a:r>
+                  <a:rPr lang="en-GB" sz="400" b="1" dirty="0"/>
+                  <a:t> </a:t>
+                </a:r>
+                <a:r>
+                  <a:rPr lang="en-GB" sz="400" b="1" dirty="0" err="1"/>
+                  <a:t>apmi</a:t>
+                </a:r>
+                <a:r>
+                  <a:rPr lang="en-GB" sz="400" b="1" dirty="0"/>
+                  <a:t> </a:t>
+                </a:r>
+                <a:r>
+                  <a:rPr lang="en-GB" sz="400" b="1" dirty="0" err="1"/>
+                  <a:t>aptil</a:t>
+                </a:r>
+                <a:r>
+                  <a:rPr lang="en-GB" sz="400" b="1" dirty="0"/>
+                  <a:t> </a:t>
+                </a:r>
+                <a:r>
+                  <a:rPr lang="en-GB" sz="400" b="1" dirty="0" err="1"/>
+                  <a:t>tio</a:t>
+                </a:r>
+                <a:endParaRPr lang="en-GB" sz="400" b="1" dirty="0"/>
+              </a:p>
+            </p:txBody>
+          </p:sp>
+        </p:grpSp>
+        <p:grpSp>
+          <p:nvGrpSpPr>
+            <p:cNvPr id="11" name="Group 10">
+              <a:extLst>
+                <a:ext uri="{FF2B5EF4-FFF2-40B4-BE49-F238E27FC236}">
+                  <a16:creationId xmlns:a16="http://schemas.microsoft.com/office/drawing/2014/main" id="{3ED16712-D7D6-C4E2-E696-F6091DDA8A1F}"/>
+                </a:ext>
+              </a:extLst>
+            </p:cNvPr>
+            <p:cNvGrpSpPr/>
+            <p:nvPr/>
+          </p:nvGrpSpPr>
+          <p:grpSpPr>
+            <a:xfrm rot="1240881">
+              <a:off x="1857548" y="1146511"/>
+              <a:ext cx="1800000" cy="2160000"/>
+              <a:chOff x="963600" y="1652002"/>
+              <a:chExt cx="1800000" cy="2160000"/>
+            </a:xfrm>
+          </p:grpSpPr>
+          <p:sp>
+            <p:nvSpPr>
+              <p:cNvPr id="17" name="Rectangle 16">
+                <a:extLst>
+                  <a:ext uri="{FF2B5EF4-FFF2-40B4-BE49-F238E27FC236}">
+                    <a16:creationId xmlns:a16="http://schemas.microsoft.com/office/drawing/2014/main" id="{9F56BF07-AB7C-A1F3-ABF9-D3E5650D9109}"/>
+                  </a:ext>
+                </a:extLst>
+              </p:cNvPr>
+              <p:cNvSpPr/>
+              <p:nvPr/>
+            </p:nvSpPr>
+            <p:spPr>
+              <a:xfrm>
+                <a:off x="963600" y="1652002"/>
+                <a:ext cx="1800000" cy="2160000"/>
+              </a:xfrm>
+              <a:prstGeom prst="rect">
+                <a:avLst/>
+              </a:prstGeom>
+              <a:solidFill>
+                <a:schemeClr val="bg1">
+                  <a:lumMod val="95000"/>
+                </a:schemeClr>
+              </a:solidFill>
+              <a:ln>
+                <a:solidFill>
+                  <a:schemeClr val="tx1"/>
+                </a:solidFill>
+              </a:ln>
+            </p:spPr>
+            <p:style>
+              <a:lnRef idx="2">
+                <a:schemeClr val="accent1">
+                  <a:shade val="15000"/>
+                </a:schemeClr>
+              </a:lnRef>
+              <a:fillRef idx="1">
+                <a:schemeClr val="accent1"/>
+              </a:fillRef>
+              <a:effectRef idx="0">
+                <a:schemeClr val="accent1"/>
+              </a:effectRef>
+              <a:fontRef idx="minor">
+                <a:schemeClr val="lt1"/>
+              </a:fontRef>
+            </p:style>
+            <p:txBody>
+              <a:bodyPr rtlCol="0" anchor="ctr"/>
+              <a:lstStyle/>
+              <a:p>
+                <a:pPr algn="ctr"/>
+                <a:endParaRPr lang="en-GB"/>
+              </a:p>
+            </p:txBody>
+          </p:sp>
+          <p:sp>
+            <p:nvSpPr>
+              <p:cNvPr id="18" name="Rectangle 17">
+                <a:extLst>
+                  <a:ext uri="{FF2B5EF4-FFF2-40B4-BE49-F238E27FC236}">
+                    <a16:creationId xmlns:a16="http://schemas.microsoft.com/office/drawing/2014/main" id="{8E680BDC-4E4C-0368-7D44-D7438A2405BC}"/>
+                  </a:ext>
+                </a:extLst>
+              </p:cNvPr>
+              <p:cNvSpPr/>
+              <p:nvPr/>
+            </p:nvSpPr>
+            <p:spPr>
+              <a:xfrm>
+                <a:off x="1071600" y="1763423"/>
+                <a:ext cx="1584000" cy="1584000"/>
+              </a:xfrm>
+              <a:prstGeom prst="rect">
+                <a:avLst/>
+              </a:prstGeom>
+            </p:spPr>
+            <p:style>
+              <a:lnRef idx="2">
+                <a:schemeClr val="accent1">
+                  <a:shade val="15000"/>
+                </a:schemeClr>
+              </a:lnRef>
+              <a:fillRef idx="1">
+                <a:schemeClr val="accent1"/>
+              </a:fillRef>
+              <a:effectRef idx="0">
+                <a:schemeClr val="accent1"/>
+              </a:effectRef>
+              <a:fontRef idx="minor">
+                <a:schemeClr val="lt1"/>
+              </a:fontRef>
+            </p:style>
+            <p:txBody>
+              <a:bodyPr rtlCol="0" anchor="ctr"/>
+              <a:lstStyle/>
+              <a:p>
+                <a:pPr algn="ctr"/>
+                <a:endParaRPr lang="en-GB"/>
+              </a:p>
+            </p:txBody>
+          </p:sp>
+          <p:sp>
+            <p:nvSpPr>
+              <p:cNvPr id="19" name="TextBox 18">
+                <a:extLst>
+                  <a:ext uri="{FF2B5EF4-FFF2-40B4-BE49-F238E27FC236}">
+                    <a16:creationId xmlns:a16="http://schemas.microsoft.com/office/drawing/2014/main" id="{9713D8B7-4FCC-C1C7-03EC-29B0B420675B}"/>
+                  </a:ext>
+                </a:extLst>
+              </p:cNvPr>
+              <p:cNvSpPr txBox="1"/>
+              <p:nvPr/>
+            </p:nvSpPr>
+            <p:spPr>
+              <a:xfrm>
+                <a:off x="1071599" y="3439720"/>
+                <a:ext cx="1583999" cy="246291"/>
+              </a:xfrm>
+              <a:prstGeom prst="rect">
+                <a:avLst/>
+              </a:prstGeom>
+              <a:noFill/>
+            </p:spPr>
+            <p:txBody>
+              <a:bodyPr wrap="square" rtlCol="0" anchor="ctr">
+                <a:spAutoFit/>
+              </a:bodyPr>
+              <a:lstStyle/>
+              <a:p>
+                <a:pPr algn="ctr"/>
+                <a:r>
+                  <a:rPr lang="en-GB" sz="400" b="1" dirty="0" err="1"/>
+                  <a:t>Scia</a:t>
+                </a:r>
+                <a:r>
+                  <a:rPr lang="en-GB" sz="400" b="1" dirty="0"/>
+                  <a:t> </a:t>
+                </a:r>
+                <a:r>
+                  <a:rPr lang="en-GB" sz="400" b="1" dirty="0" err="1"/>
+                  <a:t>ra</a:t>
+                </a:r>
+                <a:r>
+                  <a:rPr lang="en-GB" sz="400" b="1" dirty="0"/>
+                  <a:t> </a:t>
+                </a:r>
+                <a:r>
+                  <a:rPr lang="en-GB" sz="400" b="1" dirty="0" err="1"/>
+                  <a:t>aigpmb</a:t>
+                </a:r>
+                <a:r>
+                  <a:rPr lang="en-GB" sz="400" b="1" dirty="0"/>
+                  <a:t> </a:t>
+                </a:r>
+                <a:r>
+                  <a:rPr lang="en-GB" sz="400" b="1" dirty="0" err="1"/>
+                  <a:t>apmi</a:t>
+                </a:r>
+                <a:r>
+                  <a:rPr lang="en-GB" sz="400" b="1" dirty="0"/>
+                  <a:t> </a:t>
+                </a:r>
+                <a:r>
+                  <a:rPr lang="en-GB" sz="400" b="1" dirty="0" err="1"/>
+                  <a:t>aptil</a:t>
+                </a:r>
+                <a:r>
+                  <a:rPr lang="en-GB" sz="400" b="1" dirty="0"/>
+                  <a:t> </a:t>
+                </a:r>
+                <a:r>
+                  <a:rPr lang="en-GB" sz="400" b="1" dirty="0" err="1"/>
+                  <a:t>tio</a:t>
+                </a:r>
+                <a:endParaRPr lang="en-GB" sz="400" b="1" dirty="0"/>
+              </a:p>
+            </p:txBody>
+          </p:sp>
+        </p:grpSp>
+        <p:grpSp>
+          <p:nvGrpSpPr>
+            <p:cNvPr id="12" name="Group 11">
+              <a:extLst>
+                <a:ext uri="{FF2B5EF4-FFF2-40B4-BE49-F238E27FC236}">
+                  <a16:creationId xmlns:a16="http://schemas.microsoft.com/office/drawing/2014/main" id="{E2863DEC-94A7-66F8-9C98-B03DB8A9F340}"/>
+                </a:ext>
+              </a:extLst>
+            </p:cNvPr>
+            <p:cNvGrpSpPr/>
+            <p:nvPr/>
+          </p:nvGrpSpPr>
+          <p:grpSpPr>
+            <a:xfrm rot="20147910">
+              <a:off x="439577" y="482382"/>
+              <a:ext cx="1800000" cy="2160000"/>
+              <a:chOff x="963600" y="1652002"/>
+              <a:chExt cx="1800000" cy="2160000"/>
+            </a:xfrm>
+          </p:grpSpPr>
+          <p:sp>
+            <p:nvSpPr>
+              <p:cNvPr id="13" name="Rectangle 12">
+                <a:extLst>
+                  <a:ext uri="{FF2B5EF4-FFF2-40B4-BE49-F238E27FC236}">
+                    <a16:creationId xmlns:a16="http://schemas.microsoft.com/office/drawing/2014/main" id="{0892C626-190D-64F3-57F9-CC24B13737D0}"/>
+                  </a:ext>
+                </a:extLst>
+              </p:cNvPr>
+              <p:cNvSpPr/>
+              <p:nvPr/>
+            </p:nvSpPr>
+            <p:spPr>
+              <a:xfrm>
+                <a:off x="963600" y="1652002"/>
+                <a:ext cx="1800000" cy="2160000"/>
+              </a:xfrm>
+              <a:prstGeom prst="rect">
+                <a:avLst/>
+              </a:prstGeom>
+              <a:solidFill>
+                <a:schemeClr val="bg1">
+                  <a:lumMod val="95000"/>
+                </a:schemeClr>
+              </a:solidFill>
+              <a:ln>
+                <a:solidFill>
+                  <a:schemeClr val="tx1"/>
+                </a:solidFill>
+              </a:ln>
+            </p:spPr>
+            <p:style>
+              <a:lnRef idx="2">
+                <a:schemeClr val="accent1">
+                  <a:shade val="15000"/>
+                </a:schemeClr>
+              </a:lnRef>
+              <a:fillRef idx="1">
+                <a:schemeClr val="accent1"/>
+              </a:fillRef>
+              <a:effectRef idx="0">
+                <a:schemeClr val="accent1"/>
+              </a:effectRef>
+              <a:fontRef idx="minor">
+                <a:schemeClr val="lt1"/>
+              </a:fontRef>
+            </p:style>
+            <p:txBody>
+              <a:bodyPr rtlCol="0" anchor="ctr"/>
+              <a:lstStyle/>
+              <a:p>
+                <a:pPr algn="ctr"/>
+                <a:endParaRPr lang="en-GB"/>
+              </a:p>
+            </p:txBody>
+          </p:sp>
+          <p:sp>
+            <p:nvSpPr>
+              <p:cNvPr id="14" name="Rectangle 13">
+                <a:extLst>
+                  <a:ext uri="{FF2B5EF4-FFF2-40B4-BE49-F238E27FC236}">
+                    <a16:creationId xmlns:a16="http://schemas.microsoft.com/office/drawing/2014/main" id="{5E8DA211-8A75-DC0F-86E8-BADCCF52D46C}"/>
+                  </a:ext>
+                </a:extLst>
+              </p:cNvPr>
+              <p:cNvSpPr/>
+              <p:nvPr/>
+            </p:nvSpPr>
+            <p:spPr>
+              <a:xfrm>
+                <a:off x="1071600" y="1763423"/>
+                <a:ext cx="1584000" cy="1584000"/>
+              </a:xfrm>
+              <a:prstGeom prst="rect">
+                <a:avLst/>
+              </a:prstGeom>
+            </p:spPr>
+            <p:style>
+              <a:lnRef idx="2">
+                <a:schemeClr val="accent1">
+                  <a:shade val="15000"/>
+                </a:schemeClr>
+              </a:lnRef>
+              <a:fillRef idx="1">
+                <a:schemeClr val="accent1"/>
+              </a:fillRef>
+              <a:effectRef idx="0">
+                <a:schemeClr val="accent1"/>
+              </a:effectRef>
+              <a:fontRef idx="minor">
+                <a:schemeClr val="lt1"/>
+              </a:fontRef>
+            </p:style>
+            <p:txBody>
+              <a:bodyPr rtlCol="0" anchor="ctr"/>
+              <a:lstStyle/>
+              <a:p>
+                <a:pPr algn="ctr"/>
+                <a:endParaRPr lang="en-GB"/>
+              </a:p>
+            </p:txBody>
+          </p:sp>
+          <p:sp>
+            <p:nvSpPr>
+              <p:cNvPr id="15" name="TextBox 14">
+                <a:extLst>
+                  <a:ext uri="{FF2B5EF4-FFF2-40B4-BE49-F238E27FC236}">
+                    <a16:creationId xmlns:a16="http://schemas.microsoft.com/office/drawing/2014/main" id="{586292B8-91C9-B5A2-6213-7B6BDE26B9FB}"/>
+                  </a:ext>
+                </a:extLst>
+              </p:cNvPr>
+              <p:cNvSpPr txBox="1"/>
+              <p:nvPr/>
+            </p:nvSpPr>
+            <p:spPr>
+              <a:xfrm>
+                <a:off x="1071599" y="3439721"/>
+                <a:ext cx="1583999" cy="246291"/>
+              </a:xfrm>
+              <a:prstGeom prst="rect">
+                <a:avLst/>
+              </a:prstGeom>
+              <a:noFill/>
+            </p:spPr>
+            <p:txBody>
+              <a:bodyPr wrap="square" rtlCol="0" anchor="ctr">
+                <a:spAutoFit/>
+              </a:bodyPr>
+              <a:lstStyle/>
+              <a:p>
+                <a:pPr algn="ctr"/>
+                <a:r>
+                  <a:rPr lang="en-GB" sz="400" b="1" dirty="0" err="1"/>
+                  <a:t>Scia</a:t>
+                </a:r>
+                <a:r>
+                  <a:rPr lang="en-GB" sz="400" b="1" dirty="0"/>
+                  <a:t> </a:t>
+                </a:r>
+                <a:r>
+                  <a:rPr lang="en-GB" sz="400" b="1" dirty="0" err="1"/>
+                  <a:t>ra</a:t>
+                </a:r>
+                <a:r>
+                  <a:rPr lang="en-GB" sz="400" b="1" dirty="0"/>
+                  <a:t> </a:t>
+                </a:r>
+                <a:r>
+                  <a:rPr lang="en-GB" sz="400" b="1" dirty="0" err="1"/>
+                  <a:t>aigpmb</a:t>
+                </a:r>
+                <a:r>
+                  <a:rPr lang="en-GB" sz="400" b="1" dirty="0"/>
+                  <a:t> </a:t>
+                </a:r>
+                <a:r>
+                  <a:rPr lang="en-GB" sz="400" b="1" dirty="0" err="1"/>
+                  <a:t>apmi</a:t>
+                </a:r>
+                <a:r>
+                  <a:rPr lang="en-GB" sz="400" b="1" dirty="0"/>
+                  <a:t> </a:t>
+                </a:r>
+                <a:r>
+                  <a:rPr lang="en-GB" sz="400" b="1" dirty="0" err="1"/>
+                  <a:t>aptil</a:t>
+                </a:r>
+                <a:r>
+                  <a:rPr lang="en-GB" sz="400" b="1" dirty="0"/>
+                  <a:t> </a:t>
+                </a:r>
+                <a:r>
+                  <a:rPr lang="en-GB" sz="400" b="1" dirty="0" err="1"/>
+                  <a:t>tio</a:t>
+                </a:r>
+                <a:endParaRPr lang="en-GB" sz="400" b="1" dirty="0"/>
+              </a:p>
+            </p:txBody>
+          </p:sp>
+        </p:grpSp>
+      </p:grpSp>
     </p:spTree>
     <p:extLst>
       <p:ext uri="{BB962C8B-B14F-4D97-AF65-F5344CB8AC3E}">

</xml_diff>

<commit_message>
Updated plan to include gallery design
</commit_message>
<xml_diff>
--- a/Website Plan.pptx
+++ b/Website Plan.pptx
@@ -5,12 +5,13 @@
     <p:sldMasterId id="2147483672" r:id="rId1"/>
   </p:sldMasterIdLst>
   <p:notesMasterIdLst>
-    <p:notesMasterId r:id="rId5"/>
+    <p:notesMasterId r:id="rId6"/>
   </p:notesMasterIdLst>
   <p:sldIdLst>
     <p:sldId id="256" r:id="rId2"/>
     <p:sldId id="257" r:id="rId3"/>
     <p:sldId id="258" r:id="rId4"/>
+    <p:sldId id="259" r:id="rId5"/>
   </p:sldIdLst>
   <p:sldSz cx="5400675" cy="7199313"/>
   <p:notesSz cx="6858000" cy="9144000"/>
@@ -199,7 +200,7 @@
           <a:p>
             <a:fld id="{279819A7-F850-49EE-88F1-B8CD6FDC48BE}" type="datetimeFigureOut">
               <a:rPr lang="en-GB" smtClean="0"/>
-              <a:t>08/03/2024</a:t>
+              <a:t>19/03/2024</a:t>
             </a:fld>
             <a:endParaRPr lang="en-GB"/>
           </a:p>
@@ -910,6 +911,90 @@
 </p:notes>
 </file>
 
+<file path=ppt/notesSlides/notesSlide4.xml><?xml version="1.0" encoding="utf-8"?>
+<p:notes xmlns:a="http://schemas.openxmlformats.org/drawingml/2006/main" xmlns:r="http://schemas.openxmlformats.org/officeDocument/2006/relationships" xmlns:p="http://schemas.openxmlformats.org/presentationml/2006/main">
+  <p:cSld>
+    <p:spTree>
+      <p:nvGrpSpPr>
+        <p:cNvPr id="1" name=""/>
+        <p:cNvGrpSpPr/>
+        <p:nvPr/>
+      </p:nvGrpSpPr>
+      <p:grpSpPr>
+        <a:xfrm>
+          <a:off x="0" y="0"/>
+          <a:ext cx="0" cy="0"/>
+          <a:chOff x="0" y="0"/>
+          <a:chExt cx="0" cy="0"/>
+        </a:xfrm>
+      </p:grpSpPr>
+      <p:sp>
+        <p:nvSpPr>
+          <p:cNvPr id="2" name="Slide Image Placeholder 1"/>
+          <p:cNvSpPr>
+            <a:spLocks noGrp="1" noRot="1" noChangeAspect="1"/>
+          </p:cNvSpPr>
+          <p:nvPr>
+            <p:ph type="sldImg"/>
+          </p:nvPr>
+        </p:nvSpPr>
+        <p:spPr/>
+      </p:sp>
+      <p:sp>
+        <p:nvSpPr>
+          <p:cNvPr id="3" name="Notes Placeholder 2"/>
+          <p:cNvSpPr>
+            <a:spLocks noGrp="1"/>
+          </p:cNvSpPr>
+          <p:nvPr>
+            <p:ph type="body" idx="1"/>
+          </p:nvPr>
+        </p:nvSpPr>
+        <p:spPr/>
+        <p:txBody>
+          <a:bodyPr/>
+          <a:lstStyle/>
+          <a:p>
+            <a:endParaRPr lang="en-GB" dirty="0"/>
+          </a:p>
+        </p:txBody>
+      </p:sp>
+      <p:sp>
+        <p:nvSpPr>
+          <p:cNvPr id="4" name="Slide Number Placeholder 3"/>
+          <p:cNvSpPr>
+            <a:spLocks noGrp="1"/>
+          </p:cNvSpPr>
+          <p:nvPr>
+            <p:ph type="sldNum" sz="quarter" idx="5"/>
+          </p:nvPr>
+        </p:nvSpPr>
+        <p:spPr/>
+        <p:txBody>
+          <a:bodyPr/>
+          <a:lstStyle/>
+          <a:p>
+            <a:fld id="{CC662CF0-7E46-4F41-B625-40114BE78861}" type="slidenum">
+              <a:rPr lang="en-GB" smtClean="0"/>
+              <a:t>4</a:t>
+            </a:fld>
+            <a:endParaRPr lang="en-GB"/>
+          </a:p>
+        </p:txBody>
+      </p:sp>
+    </p:spTree>
+    <p:extLst>
+      <p:ext uri="{BB962C8B-B14F-4D97-AF65-F5344CB8AC3E}">
+        <p14:creationId xmlns:p14="http://schemas.microsoft.com/office/powerpoint/2010/main" val="616755515"/>
+      </p:ext>
+    </p:extLst>
+  </p:cSld>
+  <p:clrMapOvr>
+    <a:masterClrMapping/>
+  </p:clrMapOvr>
+</p:notes>
+</file>
+
 <file path=ppt/slideLayouts/slideLayout1.xml><?xml version="1.0" encoding="utf-8"?>
 <p:sldLayout xmlns:a="http://schemas.openxmlformats.org/drawingml/2006/main" xmlns:r="http://schemas.openxmlformats.org/officeDocument/2006/relationships" xmlns:p="http://schemas.openxmlformats.org/presentationml/2006/main" type="title" preserve="1">
   <p:cSld name="Title Slide">
@@ -1041,7 +1126,7 @@
           <a:p>
             <a:fld id="{CF78FF56-53FC-43BD-87F2-84749E92ACD4}" type="datetimeFigureOut">
               <a:rPr lang="en-GB" smtClean="0"/>
-              <a:t>08/03/2024</a:t>
+              <a:t>19/03/2024</a:t>
             </a:fld>
             <a:endParaRPr lang="en-GB"/>
           </a:p>
@@ -1211,7 +1296,7 @@
           <a:p>
             <a:fld id="{CF78FF56-53FC-43BD-87F2-84749E92ACD4}" type="datetimeFigureOut">
               <a:rPr lang="en-GB" smtClean="0"/>
-              <a:t>08/03/2024</a:t>
+              <a:t>19/03/2024</a:t>
             </a:fld>
             <a:endParaRPr lang="en-GB"/>
           </a:p>
@@ -1391,7 +1476,7 @@
           <a:p>
             <a:fld id="{CF78FF56-53FC-43BD-87F2-84749E92ACD4}" type="datetimeFigureOut">
               <a:rPr lang="en-GB" smtClean="0"/>
-              <a:t>08/03/2024</a:t>
+              <a:t>19/03/2024</a:t>
             </a:fld>
             <a:endParaRPr lang="en-GB"/>
           </a:p>
@@ -1561,7 +1646,7 @@
           <a:p>
             <a:fld id="{CF78FF56-53FC-43BD-87F2-84749E92ACD4}" type="datetimeFigureOut">
               <a:rPr lang="en-GB" smtClean="0"/>
-              <a:t>08/03/2024</a:t>
+              <a:t>19/03/2024</a:t>
             </a:fld>
             <a:endParaRPr lang="en-GB"/>
           </a:p>
@@ -1807,7 +1892,7 @@
           <a:p>
             <a:fld id="{CF78FF56-53FC-43BD-87F2-84749E92ACD4}" type="datetimeFigureOut">
               <a:rPr lang="en-GB" smtClean="0"/>
-              <a:t>08/03/2024</a:t>
+              <a:t>19/03/2024</a:t>
             </a:fld>
             <a:endParaRPr lang="en-GB"/>
           </a:p>
@@ -2039,7 +2124,7 @@
           <a:p>
             <a:fld id="{CF78FF56-53FC-43BD-87F2-84749E92ACD4}" type="datetimeFigureOut">
               <a:rPr lang="en-GB" smtClean="0"/>
-              <a:t>08/03/2024</a:t>
+              <a:t>19/03/2024</a:t>
             </a:fld>
             <a:endParaRPr lang="en-GB"/>
           </a:p>
@@ -2406,7 +2491,7 @@
           <a:p>
             <a:fld id="{CF78FF56-53FC-43BD-87F2-84749E92ACD4}" type="datetimeFigureOut">
               <a:rPr lang="en-GB" smtClean="0"/>
-              <a:t>08/03/2024</a:t>
+              <a:t>19/03/2024</a:t>
             </a:fld>
             <a:endParaRPr lang="en-GB"/>
           </a:p>
@@ -2524,7 +2609,7 @@
           <a:p>
             <a:fld id="{CF78FF56-53FC-43BD-87F2-84749E92ACD4}" type="datetimeFigureOut">
               <a:rPr lang="en-GB" smtClean="0"/>
-              <a:t>08/03/2024</a:t>
+              <a:t>19/03/2024</a:t>
             </a:fld>
             <a:endParaRPr lang="en-GB"/>
           </a:p>
@@ -2619,7 +2704,7 @@
           <a:p>
             <a:fld id="{CF78FF56-53FC-43BD-87F2-84749E92ACD4}" type="datetimeFigureOut">
               <a:rPr lang="en-GB" smtClean="0"/>
-              <a:t>08/03/2024</a:t>
+              <a:t>19/03/2024</a:t>
             </a:fld>
             <a:endParaRPr lang="en-GB"/>
           </a:p>
@@ -2896,7 +2981,7 @@
           <a:p>
             <a:fld id="{CF78FF56-53FC-43BD-87F2-84749E92ACD4}" type="datetimeFigureOut">
               <a:rPr lang="en-GB" smtClean="0"/>
-              <a:t>08/03/2024</a:t>
+              <a:t>19/03/2024</a:t>
             </a:fld>
             <a:endParaRPr lang="en-GB"/>
           </a:p>
@@ -3153,7 +3238,7 @@
           <a:p>
             <a:fld id="{CF78FF56-53FC-43BD-87F2-84749E92ACD4}" type="datetimeFigureOut">
               <a:rPr lang="en-GB" smtClean="0"/>
-              <a:t>08/03/2024</a:t>
+              <a:t>19/03/2024</a:t>
             </a:fld>
             <a:endParaRPr lang="en-GB"/>
           </a:p>
@@ -3366,7 +3451,7 @@
           <a:p>
             <a:fld id="{CF78FF56-53FC-43BD-87F2-84749E92ACD4}" type="datetimeFigureOut">
               <a:rPr lang="en-GB" smtClean="0"/>
-              <a:t>08/03/2024</a:t>
+              <a:t>19/03/2024</a:t>
             </a:fld>
             <a:endParaRPr lang="en-GB"/>
           </a:p>
@@ -4365,7 +4450,7 @@
         <p:spPr>
           <a:xfrm>
             <a:off x="466531" y="5635690"/>
-            <a:ext cx="3741575" cy="821094"/>
+            <a:ext cx="4473331" cy="821094"/>
           </a:xfrm>
           <a:prstGeom prst="rect">
             <a:avLst/>
@@ -4402,6 +4487,7 @@
       <p:sp>
         <p:nvSpPr>
           <p:cNvPr id="52" name="Rectangle 51">
+            <a:hlinkClick r:id="rId3" action="ppaction://hlinksldjump"/>
             <a:extLst>
               <a:ext uri="{FF2B5EF4-FFF2-40B4-BE49-F238E27FC236}">
                 <a16:creationId xmlns:a16="http://schemas.microsoft.com/office/drawing/2014/main" id="{F1C8BFA2-978F-8041-0FB2-BD17977DFB8F}"/>
@@ -4414,7 +4500,7 @@
         <p:spPr>
           <a:xfrm>
             <a:off x="466531" y="4231148"/>
-            <a:ext cx="3741575" cy="821094"/>
+            <a:ext cx="4473331" cy="821094"/>
           </a:xfrm>
           <a:prstGeom prst="rect">
             <a:avLst/>
@@ -4443,15 +4529,7 @@
             <a:pPr algn="ctr"/>
             <a:r>
               <a:rPr lang="en-GB" dirty="0"/>
-              <a:t>Embedded google photos or </a:t>
-            </a:r>
-            <a:r>
-              <a:rPr lang="en-GB" dirty="0" err="1"/>
-              <a:t>facebook</a:t>
-            </a:r>
-            <a:r>
-              <a:rPr lang="en-GB" dirty="0"/>
-              <a:t> album?</a:t>
+              <a:t>Click to see design of gallery</a:t>
             </a:r>
           </a:p>
         </p:txBody>
@@ -4471,11 +4549,11 @@
           <p:nvPr/>
         </p:nvPicPr>
         <p:blipFill rotWithShape="1">
-          <a:blip r:embed="rId3">
+          <a:blip r:embed="rId4">
             <a:extLst>
               <a:ext uri="{BEBA8EAE-BF5A-486C-A8C5-ECC9F3942E4B}">
                 <a14:imgProps xmlns:a14="http://schemas.microsoft.com/office/drawing/2010/main">
-                  <a14:imgLayer r:embed="rId4">
+                  <a14:imgLayer r:embed="rId5">
                     <a14:imgEffect>
                       <a14:backgroundRemoval t="16864" b="74083" l="20250" r="82250">
                         <a14:foregroundMark x1="23188" y1="48047" x2="23188" y2="48047"/>
@@ -8384,6 +8462,1591 @@
 </p:sld>
 </file>
 
+<file path=ppt/slides/slide4.xml><?xml version="1.0" encoding="utf-8"?>
+<p:sld xmlns:a="http://schemas.openxmlformats.org/drawingml/2006/main" xmlns:r="http://schemas.openxmlformats.org/officeDocument/2006/relationships" xmlns:p="http://schemas.openxmlformats.org/presentationml/2006/main">
+  <p:cSld>
+    <p:spTree>
+      <p:nvGrpSpPr>
+        <p:cNvPr id="1" name=""/>
+        <p:cNvGrpSpPr/>
+        <p:nvPr/>
+      </p:nvGrpSpPr>
+      <p:grpSpPr>
+        <a:xfrm>
+          <a:off x="0" y="0"/>
+          <a:ext cx="0" cy="0"/>
+          <a:chOff x="0" y="0"/>
+          <a:chExt cx="0" cy="0"/>
+        </a:xfrm>
+      </p:grpSpPr>
+      <p:sp>
+        <p:nvSpPr>
+          <p:cNvPr id="17" name="Rectangle 16">
+            <a:extLst>
+              <a:ext uri="{FF2B5EF4-FFF2-40B4-BE49-F238E27FC236}">
+                <a16:creationId xmlns:a16="http://schemas.microsoft.com/office/drawing/2014/main" id="{95C67E3C-8864-DA41-EA8C-E99A0A42D480}"/>
+              </a:ext>
+            </a:extLst>
+          </p:cNvPr>
+          <p:cNvSpPr/>
+          <p:nvPr/>
+        </p:nvSpPr>
+        <p:spPr>
+          <a:xfrm>
+            <a:off x="-1" y="1366345"/>
+            <a:ext cx="5400675" cy="4274604"/>
+          </a:xfrm>
+          <a:prstGeom prst="rect">
+            <a:avLst/>
+          </a:prstGeom>
+          <a:solidFill>
+            <a:schemeClr val="bg1">
+              <a:lumMod val="85000"/>
+            </a:schemeClr>
+          </a:solidFill>
+          <a:ln>
+            <a:noFill/>
+          </a:ln>
+        </p:spPr>
+        <p:style>
+          <a:lnRef idx="2">
+            <a:schemeClr val="accent1">
+              <a:shade val="15000"/>
+            </a:schemeClr>
+          </a:lnRef>
+          <a:fillRef idx="1">
+            <a:schemeClr val="accent1"/>
+          </a:fillRef>
+          <a:effectRef idx="0">
+            <a:schemeClr val="accent1"/>
+          </a:effectRef>
+          <a:fontRef idx="minor">
+            <a:schemeClr val="lt1"/>
+          </a:fontRef>
+        </p:style>
+        <p:txBody>
+          <a:bodyPr rtlCol="0" anchor="ctr"/>
+          <a:lstStyle/>
+          <a:p>
+            <a:pPr algn="ctr"/>
+            <a:endParaRPr lang="en-GB"/>
+          </a:p>
+        </p:txBody>
+      </p:sp>
+      <p:grpSp>
+        <p:nvGrpSpPr>
+          <p:cNvPr id="7" name="Group 6">
+            <a:extLst>
+              <a:ext uri="{FF2B5EF4-FFF2-40B4-BE49-F238E27FC236}">
+                <a16:creationId xmlns:a16="http://schemas.microsoft.com/office/drawing/2014/main" id="{E132FB93-5370-788F-CB9A-0CC9EEB69834}"/>
+              </a:ext>
+            </a:extLst>
+          </p:cNvPr>
+          <p:cNvGrpSpPr/>
+          <p:nvPr/>
+        </p:nvGrpSpPr>
+        <p:grpSpPr>
+          <a:xfrm>
+            <a:off x="1501729" y="1897152"/>
+            <a:ext cx="2397215" cy="2876659"/>
+            <a:chOff x="963600" y="1652002"/>
+            <a:chExt cx="1800000" cy="2160000"/>
+          </a:xfrm>
+        </p:grpSpPr>
+        <p:sp>
+          <p:nvSpPr>
+            <p:cNvPr id="8" name="Rectangle 7">
+              <a:extLst>
+                <a:ext uri="{FF2B5EF4-FFF2-40B4-BE49-F238E27FC236}">
+                  <a16:creationId xmlns:a16="http://schemas.microsoft.com/office/drawing/2014/main" id="{17F2CB2A-C526-F2A2-EC4A-4F8ED8A02B1B}"/>
+                </a:ext>
+              </a:extLst>
+            </p:cNvPr>
+            <p:cNvSpPr/>
+            <p:nvPr/>
+          </p:nvSpPr>
+          <p:spPr>
+            <a:xfrm>
+              <a:off x="963600" y="1652002"/>
+              <a:ext cx="1800000" cy="2160000"/>
+            </a:xfrm>
+            <a:prstGeom prst="rect">
+              <a:avLst/>
+            </a:prstGeom>
+            <a:solidFill>
+              <a:schemeClr val="bg1">
+                <a:lumMod val="95000"/>
+              </a:schemeClr>
+            </a:solidFill>
+            <a:ln>
+              <a:solidFill>
+                <a:schemeClr val="tx1"/>
+              </a:solidFill>
+            </a:ln>
+          </p:spPr>
+          <p:style>
+            <a:lnRef idx="2">
+              <a:schemeClr val="accent1">
+                <a:shade val="15000"/>
+              </a:schemeClr>
+            </a:lnRef>
+            <a:fillRef idx="1">
+              <a:schemeClr val="accent1"/>
+            </a:fillRef>
+            <a:effectRef idx="0">
+              <a:schemeClr val="accent1"/>
+            </a:effectRef>
+            <a:fontRef idx="minor">
+              <a:schemeClr val="lt1"/>
+            </a:fontRef>
+          </p:style>
+          <p:txBody>
+            <a:bodyPr rtlCol="0" anchor="ctr"/>
+            <a:lstStyle/>
+            <a:p>
+              <a:pPr algn="ctr"/>
+              <a:endParaRPr lang="en-GB"/>
+            </a:p>
+          </p:txBody>
+        </p:sp>
+        <p:sp>
+          <p:nvSpPr>
+            <p:cNvPr id="9" name="Rectangle 8">
+              <a:extLst>
+                <a:ext uri="{FF2B5EF4-FFF2-40B4-BE49-F238E27FC236}">
+                  <a16:creationId xmlns:a16="http://schemas.microsoft.com/office/drawing/2014/main" id="{9DD8B11E-BA41-7A19-F6AC-A804C026505F}"/>
+                </a:ext>
+              </a:extLst>
+            </p:cNvPr>
+            <p:cNvSpPr/>
+            <p:nvPr/>
+          </p:nvSpPr>
+          <p:spPr>
+            <a:xfrm>
+              <a:off x="1071600" y="1763423"/>
+              <a:ext cx="1584000" cy="1584000"/>
+            </a:xfrm>
+            <a:prstGeom prst="rect">
+              <a:avLst/>
+            </a:prstGeom>
+          </p:spPr>
+          <p:style>
+            <a:lnRef idx="2">
+              <a:schemeClr val="accent1">
+                <a:shade val="15000"/>
+              </a:schemeClr>
+            </a:lnRef>
+            <a:fillRef idx="1">
+              <a:schemeClr val="accent1"/>
+            </a:fillRef>
+            <a:effectRef idx="0">
+              <a:schemeClr val="accent1"/>
+            </a:effectRef>
+            <a:fontRef idx="minor">
+              <a:schemeClr val="lt1"/>
+            </a:fontRef>
+          </p:style>
+          <p:txBody>
+            <a:bodyPr rtlCol="0" anchor="ctr"/>
+            <a:lstStyle/>
+            <a:p>
+              <a:pPr algn="ctr"/>
+              <a:endParaRPr lang="en-GB"/>
+            </a:p>
+          </p:txBody>
+        </p:sp>
+        <p:sp>
+          <p:nvSpPr>
+            <p:cNvPr id="10" name="TextBox 9">
+              <a:extLst>
+                <a:ext uri="{FF2B5EF4-FFF2-40B4-BE49-F238E27FC236}">
+                  <a16:creationId xmlns:a16="http://schemas.microsoft.com/office/drawing/2014/main" id="{D92975DA-8D04-B6AD-4435-B5FD256CA094}"/>
+                </a:ext>
+              </a:extLst>
+            </p:cNvPr>
+            <p:cNvSpPr txBox="1"/>
+            <p:nvPr/>
+          </p:nvSpPr>
+          <p:spPr>
+            <a:xfrm rot="207234">
+              <a:off x="1071599" y="3366434"/>
+              <a:ext cx="1583999" cy="392871"/>
+            </a:xfrm>
+            <a:prstGeom prst="rect">
+              <a:avLst/>
+            </a:prstGeom>
+            <a:noFill/>
+          </p:spPr>
+          <p:txBody>
+            <a:bodyPr wrap="square" rtlCol="0" anchor="ctr">
+              <a:spAutoFit/>
+            </a:bodyPr>
+            <a:lstStyle/>
+            <a:p>
+              <a:pPr algn="ctr"/>
+              <a:r>
+                <a:rPr lang="en-GB" sz="1400" b="1" dirty="0" err="1">
+                  <a:latin typeface="Harlow Solid Italic" panose="04030604020F02020D02" pitchFamily="82" charset="0"/>
+                </a:rPr>
+                <a:t>Scia</a:t>
+              </a:r>
+              <a:r>
+                <a:rPr lang="en-GB" sz="1400" b="1" dirty="0">
+                  <a:latin typeface="Harlow Solid Italic" panose="04030604020F02020D02" pitchFamily="82" charset="0"/>
+                </a:rPr>
+                <a:t> </a:t>
+              </a:r>
+              <a:r>
+                <a:rPr lang="en-GB" sz="1400" b="1" dirty="0" err="1">
+                  <a:latin typeface="Harlow Solid Italic" panose="04030604020F02020D02" pitchFamily="82" charset="0"/>
+                </a:rPr>
+                <a:t>ra</a:t>
+              </a:r>
+              <a:r>
+                <a:rPr lang="en-GB" sz="1400" b="1" dirty="0">
+                  <a:latin typeface="Harlow Solid Italic" panose="04030604020F02020D02" pitchFamily="82" charset="0"/>
+                </a:rPr>
+                <a:t> </a:t>
+              </a:r>
+              <a:r>
+                <a:rPr lang="en-GB" sz="1400" b="1" dirty="0" err="1">
+                  <a:latin typeface="Harlow Solid Italic" panose="04030604020F02020D02" pitchFamily="82" charset="0"/>
+                </a:rPr>
+                <a:t>aigpmb</a:t>
+              </a:r>
+              <a:r>
+                <a:rPr lang="en-GB" sz="1400" b="1" dirty="0">
+                  <a:latin typeface="Harlow Solid Italic" panose="04030604020F02020D02" pitchFamily="82" charset="0"/>
+                </a:rPr>
+                <a:t> </a:t>
+              </a:r>
+              <a:r>
+                <a:rPr lang="en-GB" sz="1400" b="1" dirty="0" err="1">
+                  <a:latin typeface="Harlow Solid Italic" panose="04030604020F02020D02" pitchFamily="82" charset="0"/>
+                </a:rPr>
+                <a:t>apmi</a:t>
+              </a:r>
+              <a:r>
+                <a:rPr lang="en-GB" sz="1400" b="1" dirty="0">
+                  <a:latin typeface="Harlow Solid Italic" panose="04030604020F02020D02" pitchFamily="82" charset="0"/>
+                </a:rPr>
+                <a:t> </a:t>
+              </a:r>
+              <a:r>
+                <a:rPr lang="en-GB" sz="1400" b="1" dirty="0" err="1">
+                  <a:latin typeface="Harlow Solid Italic" panose="04030604020F02020D02" pitchFamily="82" charset="0"/>
+                </a:rPr>
+                <a:t>aptil</a:t>
+              </a:r>
+              <a:r>
+                <a:rPr lang="en-GB" sz="1400" b="1" dirty="0">
+                  <a:latin typeface="Harlow Solid Italic" panose="04030604020F02020D02" pitchFamily="82" charset="0"/>
+                </a:rPr>
+                <a:t> </a:t>
+              </a:r>
+              <a:r>
+                <a:rPr lang="en-GB" sz="1400" b="1" dirty="0" err="1">
+                  <a:latin typeface="Harlow Solid Italic" panose="04030604020F02020D02" pitchFamily="82" charset="0"/>
+                </a:rPr>
+                <a:t>tio</a:t>
+              </a:r>
+              <a:endParaRPr lang="en-GB" sz="1400" b="1" dirty="0">
+                <a:latin typeface="Harlow Solid Italic" panose="04030604020F02020D02" pitchFamily="82" charset="0"/>
+              </a:endParaRPr>
+            </a:p>
+          </p:txBody>
+        </p:sp>
+      </p:grpSp>
+      <p:grpSp>
+        <p:nvGrpSpPr>
+          <p:cNvPr id="18" name="Group 17">
+            <a:extLst>
+              <a:ext uri="{FF2B5EF4-FFF2-40B4-BE49-F238E27FC236}">
+                <a16:creationId xmlns:a16="http://schemas.microsoft.com/office/drawing/2014/main" id="{93BD7BBC-F20B-3EF4-9629-E6A088FF021E}"/>
+              </a:ext>
+            </a:extLst>
+          </p:cNvPr>
+          <p:cNvGrpSpPr/>
+          <p:nvPr/>
+        </p:nvGrpSpPr>
+        <p:grpSpPr>
+          <a:xfrm>
+            <a:off x="-1278258" y="1897151"/>
+            <a:ext cx="2397215" cy="2876659"/>
+            <a:chOff x="963600" y="1652002"/>
+            <a:chExt cx="1800000" cy="2160000"/>
+          </a:xfrm>
+        </p:grpSpPr>
+        <p:sp>
+          <p:nvSpPr>
+            <p:cNvPr id="19" name="Rectangle 18">
+              <a:extLst>
+                <a:ext uri="{FF2B5EF4-FFF2-40B4-BE49-F238E27FC236}">
+                  <a16:creationId xmlns:a16="http://schemas.microsoft.com/office/drawing/2014/main" id="{EB0D35AE-5B1F-F711-DCCC-14535012FDCB}"/>
+                </a:ext>
+              </a:extLst>
+            </p:cNvPr>
+            <p:cNvSpPr/>
+            <p:nvPr/>
+          </p:nvSpPr>
+          <p:spPr>
+            <a:xfrm>
+              <a:off x="963600" y="1652002"/>
+              <a:ext cx="1800000" cy="2160000"/>
+            </a:xfrm>
+            <a:prstGeom prst="rect">
+              <a:avLst/>
+            </a:prstGeom>
+            <a:solidFill>
+              <a:schemeClr val="bg1">
+                <a:lumMod val="95000"/>
+              </a:schemeClr>
+            </a:solidFill>
+            <a:ln>
+              <a:solidFill>
+                <a:schemeClr val="tx1"/>
+              </a:solidFill>
+            </a:ln>
+          </p:spPr>
+          <p:style>
+            <a:lnRef idx="2">
+              <a:schemeClr val="accent1">
+                <a:shade val="15000"/>
+              </a:schemeClr>
+            </a:lnRef>
+            <a:fillRef idx="1">
+              <a:schemeClr val="accent1"/>
+            </a:fillRef>
+            <a:effectRef idx="0">
+              <a:schemeClr val="accent1"/>
+            </a:effectRef>
+            <a:fontRef idx="minor">
+              <a:schemeClr val="lt1"/>
+            </a:fontRef>
+          </p:style>
+          <p:txBody>
+            <a:bodyPr rtlCol="0" anchor="ctr"/>
+            <a:lstStyle/>
+            <a:p>
+              <a:pPr algn="ctr"/>
+              <a:endParaRPr lang="en-GB"/>
+            </a:p>
+          </p:txBody>
+        </p:sp>
+        <p:sp>
+          <p:nvSpPr>
+            <p:cNvPr id="20" name="Rectangle 19">
+              <a:extLst>
+                <a:ext uri="{FF2B5EF4-FFF2-40B4-BE49-F238E27FC236}">
+                  <a16:creationId xmlns:a16="http://schemas.microsoft.com/office/drawing/2014/main" id="{B0C2A3A1-B890-35E5-97F5-B3EA880B85AD}"/>
+                </a:ext>
+              </a:extLst>
+            </p:cNvPr>
+            <p:cNvSpPr/>
+            <p:nvPr/>
+          </p:nvSpPr>
+          <p:spPr>
+            <a:xfrm>
+              <a:off x="1071600" y="1763423"/>
+              <a:ext cx="1584000" cy="1584000"/>
+            </a:xfrm>
+            <a:prstGeom prst="rect">
+              <a:avLst/>
+            </a:prstGeom>
+          </p:spPr>
+          <p:style>
+            <a:lnRef idx="2">
+              <a:schemeClr val="accent1">
+                <a:shade val="15000"/>
+              </a:schemeClr>
+            </a:lnRef>
+            <a:fillRef idx="1">
+              <a:schemeClr val="accent1"/>
+            </a:fillRef>
+            <a:effectRef idx="0">
+              <a:schemeClr val="accent1"/>
+            </a:effectRef>
+            <a:fontRef idx="minor">
+              <a:schemeClr val="lt1"/>
+            </a:fontRef>
+          </p:style>
+          <p:txBody>
+            <a:bodyPr rtlCol="0" anchor="ctr"/>
+            <a:lstStyle/>
+            <a:p>
+              <a:pPr algn="ctr"/>
+              <a:endParaRPr lang="en-GB"/>
+            </a:p>
+          </p:txBody>
+        </p:sp>
+        <p:sp>
+          <p:nvSpPr>
+            <p:cNvPr id="21" name="TextBox 20">
+              <a:extLst>
+                <a:ext uri="{FF2B5EF4-FFF2-40B4-BE49-F238E27FC236}">
+                  <a16:creationId xmlns:a16="http://schemas.microsoft.com/office/drawing/2014/main" id="{B101260B-0CBD-5DE0-6A73-2634CC3908CF}"/>
+                </a:ext>
+              </a:extLst>
+            </p:cNvPr>
+            <p:cNvSpPr txBox="1"/>
+            <p:nvPr/>
+          </p:nvSpPr>
+          <p:spPr>
+            <a:xfrm rot="21323136">
+              <a:off x="1071599" y="3467541"/>
+              <a:ext cx="1583999" cy="190658"/>
+            </a:xfrm>
+            <a:prstGeom prst="rect">
+              <a:avLst/>
+            </a:prstGeom>
+            <a:noFill/>
+          </p:spPr>
+          <p:txBody>
+            <a:bodyPr wrap="square" rtlCol="0" anchor="ctr">
+              <a:spAutoFit/>
+            </a:bodyPr>
+            <a:lstStyle/>
+            <a:p>
+              <a:pPr algn="ctr"/>
+              <a:r>
+                <a:rPr lang="en-GB" sz="1050" b="1" dirty="0" err="1">
+                  <a:latin typeface="Harlow Solid Italic" panose="04030604020F02020D02" pitchFamily="82" charset="0"/>
+                </a:rPr>
+                <a:t>Scia</a:t>
+              </a:r>
+              <a:r>
+                <a:rPr lang="en-GB" sz="1050" b="1" dirty="0">
+                  <a:latin typeface="Harlow Solid Italic" panose="04030604020F02020D02" pitchFamily="82" charset="0"/>
+                </a:rPr>
+                <a:t> </a:t>
+              </a:r>
+              <a:r>
+                <a:rPr lang="en-GB" sz="1050" b="1" dirty="0" err="1">
+                  <a:latin typeface="Harlow Solid Italic" panose="04030604020F02020D02" pitchFamily="82" charset="0"/>
+                </a:rPr>
+                <a:t>ra</a:t>
+              </a:r>
+              <a:r>
+                <a:rPr lang="en-GB" sz="1050" b="1" dirty="0">
+                  <a:latin typeface="Harlow Solid Italic" panose="04030604020F02020D02" pitchFamily="82" charset="0"/>
+                </a:rPr>
+                <a:t> </a:t>
+              </a:r>
+              <a:r>
+                <a:rPr lang="en-GB" sz="1050" b="1" dirty="0" err="1">
+                  <a:latin typeface="Harlow Solid Italic" panose="04030604020F02020D02" pitchFamily="82" charset="0"/>
+                </a:rPr>
+                <a:t>aigpmb</a:t>
+              </a:r>
+              <a:r>
+                <a:rPr lang="en-GB" sz="1050" b="1" dirty="0">
+                  <a:latin typeface="Harlow Solid Italic" panose="04030604020F02020D02" pitchFamily="82" charset="0"/>
+                </a:rPr>
+                <a:t> </a:t>
+              </a:r>
+              <a:r>
+                <a:rPr lang="en-GB" sz="1050" b="1" dirty="0" err="1">
+                  <a:latin typeface="Harlow Solid Italic" panose="04030604020F02020D02" pitchFamily="82" charset="0"/>
+                </a:rPr>
+                <a:t>apmi</a:t>
+              </a:r>
+              <a:r>
+                <a:rPr lang="en-GB" sz="1050" b="1" dirty="0">
+                  <a:latin typeface="Harlow Solid Italic" panose="04030604020F02020D02" pitchFamily="82" charset="0"/>
+                </a:rPr>
+                <a:t> </a:t>
+              </a:r>
+              <a:r>
+                <a:rPr lang="en-GB" sz="1050" b="1" dirty="0" err="1">
+                  <a:latin typeface="Harlow Solid Italic" panose="04030604020F02020D02" pitchFamily="82" charset="0"/>
+                </a:rPr>
+                <a:t>aptil</a:t>
+              </a:r>
+              <a:r>
+                <a:rPr lang="en-GB" sz="1050" b="1" dirty="0">
+                  <a:latin typeface="Harlow Solid Italic" panose="04030604020F02020D02" pitchFamily="82" charset="0"/>
+                </a:rPr>
+                <a:t> </a:t>
+              </a:r>
+              <a:r>
+                <a:rPr lang="en-GB" sz="1050" b="1" dirty="0" err="1">
+                  <a:latin typeface="Harlow Solid Italic" panose="04030604020F02020D02" pitchFamily="82" charset="0"/>
+                </a:rPr>
+                <a:t>tio</a:t>
+              </a:r>
+              <a:endParaRPr lang="en-GB" sz="1050" b="1" dirty="0">
+                <a:latin typeface="Harlow Solid Italic" panose="04030604020F02020D02" pitchFamily="82" charset="0"/>
+              </a:endParaRPr>
+            </a:p>
+          </p:txBody>
+        </p:sp>
+      </p:grpSp>
+      <p:grpSp>
+        <p:nvGrpSpPr>
+          <p:cNvPr id="22" name="Group 21">
+            <a:extLst>
+              <a:ext uri="{FF2B5EF4-FFF2-40B4-BE49-F238E27FC236}">
+                <a16:creationId xmlns:a16="http://schemas.microsoft.com/office/drawing/2014/main" id="{A670BC55-73E7-74A9-9CC1-4D2ECC711B9E}"/>
+              </a:ext>
+            </a:extLst>
+          </p:cNvPr>
+          <p:cNvGrpSpPr/>
+          <p:nvPr/>
+        </p:nvGrpSpPr>
+        <p:grpSpPr>
+          <a:xfrm>
+            <a:off x="4281716" y="1897150"/>
+            <a:ext cx="2397215" cy="2876659"/>
+            <a:chOff x="963600" y="1652002"/>
+            <a:chExt cx="1800000" cy="2160000"/>
+          </a:xfrm>
+        </p:grpSpPr>
+        <p:sp>
+          <p:nvSpPr>
+            <p:cNvPr id="23" name="Rectangle 22">
+              <a:extLst>
+                <a:ext uri="{FF2B5EF4-FFF2-40B4-BE49-F238E27FC236}">
+                  <a16:creationId xmlns:a16="http://schemas.microsoft.com/office/drawing/2014/main" id="{5B7B8527-7541-809E-DC1B-85C164FDADCB}"/>
+                </a:ext>
+              </a:extLst>
+            </p:cNvPr>
+            <p:cNvSpPr/>
+            <p:nvPr/>
+          </p:nvSpPr>
+          <p:spPr>
+            <a:xfrm>
+              <a:off x="963600" y="1652002"/>
+              <a:ext cx="1800000" cy="2160000"/>
+            </a:xfrm>
+            <a:prstGeom prst="rect">
+              <a:avLst/>
+            </a:prstGeom>
+            <a:solidFill>
+              <a:schemeClr val="bg1">
+                <a:lumMod val="95000"/>
+              </a:schemeClr>
+            </a:solidFill>
+            <a:ln>
+              <a:solidFill>
+                <a:schemeClr val="tx1"/>
+              </a:solidFill>
+            </a:ln>
+          </p:spPr>
+          <p:style>
+            <a:lnRef idx="2">
+              <a:schemeClr val="accent1">
+                <a:shade val="15000"/>
+              </a:schemeClr>
+            </a:lnRef>
+            <a:fillRef idx="1">
+              <a:schemeClr val="accent1"/>
+            </a:fillRef>
+            <a:effectRef idx="0">
+              <a:schemeClr val="accent1"/>
+            </a:effectRef>
+            <a:fontRef idx="minor">
+              <a:schemeClr val="lt1"/>
+            </a:fontRef>
+          </p:style>
+          <p:txBody>
+            <a:bodyPr rtlCol="0" anchor="ctr"/>
+            <a:lstStyle/>
+            <a:p>
+              <a:pPr algn="ctr"/>
+              <a:endParaRPr lang="en-GB"/>
+            </a:p>
+          </p:txBody>
+        </p:sp>
+        <p:sp>
+          <p:nvSpPr>
+            <p:cNvPr id="24" name="Rectangle 23">
+              <a:extLst>
+                <a:ext uri="{FF2B5EF4-FFF2-40B4-BE49-F238E27FC236}">
+                  <a16:creationId xmlns:a16="http://schemas.microsoft.com/office/drawing/2014/main" id="{91167FC4-5261-AC73-CBB1-B17862CC4E10}"/>
+                </a:ext>
+              </a:extLst>
+            </p:cNvPr>
+            <p:cNvSpPr/>
+            <p:nvPr/>
+          </p:nvSpPr>
+          <p:spPr>
+            <a:xfrm>
+              <a:off x="1071600" y="1763423"/>
+              <a:ext cx="1584000" cy="1584000"/>
+            </a:xfrm>
+            <a:prstGeom prst="rect">
+              <a:avLst/>
+            </a:prstGeom>
+          </p:spPr>
+          <p:style>
+            <a:lnRef idx="2">
+              <a:schemeClr val="accent1">
+                <a:shade val="15000"/>
+              </a:schemeClr>
+            </a:lnRef>
+            <a:fillRef idx="1">
+              <a:schemeClr val="accent1"/>
+            </a:fillRef>
+            <a:effectRef idx="0">
+              <a:schemeClr val="accent1"/>
+            </a:effectRef>
+            <a:fontRef idx="minor">
+              <a:schemeClr val="lt1"/>
+            </a:fontRef>
+          </p:style>
+          <p:txBody>
+            <a:bodyPr rtlCol="0" anchor="ctr"/>
+            <a:lstStyle/>
+            <a:p>
+              <a:pPr algn="ctr"/>
+              <a:endParaRPr lang="en-GB"/>
+            </a:p>
+          </p:txBody>
+        </p:sp>
+        <p:sp>
+          <p:nvSpPr>
+            <p:cNvPr id="25" name="TextBox 24">
+              <a:extLst>
+                <a:ext uri="{FF2B5EF4-FFF2-40B4-BE49-F238E27FC236}">
+                  <a16:creationId xmlns:a16="http://schemas.microsoft.com/office/drawing/2014/main" id="{F3667EAC-254F-429D-1AE4-7EF280E092B8}"/>
+                </a:ext>
+              </a:extLst>
+            </p:cNvPr>
+            <p:cNvSpPr txBox="1"/>
+            <p:nvPr/>
+          </p:nvSpPr>
+          <p:spPr>
+            <a:xfrm rot="901768">
+              <a:off x="1071599" y="3467541"/>
+              <a:ext cx="1583999" cy="190658"/>
+            </a:xfrm>
+            <a:prstGeom prst="rect">
+              <a:avLst/>
+            </a:prstGeom>
+            <a:noFill/>
+          </p:spPr>
+          <p:txBody>
+            <a:bodyPr wrap="square" rtlCol="0" anchor="ctr">
+              <a:spAutoFit/>
+            </a:bodyPr>
+            <a:lstStyle/>
+            <a:p>
+              <a:pPr algn="ctr"/>
+              <a:r>
+                <a:rPr lang="en-GB" sz="1050" b="1" dirty="0" err="1">
+                  <a:latin typeface="Harlow Solid Italic" panose="04030604020F02020D02" pitchFamily="82" charset="0"/>
+                </a:rPr>
+                <a:t>Scia</a:t>
+              </a:r>
+              <a:r>
+                <a:rPr lang="en-GB" sz="1050" b="1" dirty="0">
+                  <a:latin typeface="Harlow Solid Italic" panose="04030604020F02020D02" pitchFamily="82" charset="0"/>
+                </a:rPr>
+                <a:t> </a:t>
+              </a:r>
+              <a:r>
+                <a:rPr lang="en-GB" sz="1050" b="1" dirty="0" err="1">
+                  <a:latin typeface="Harlow Solid Italic" panose="04030604020F02020D02" pitchFamily="82" charset="0"/>
+                </a:rPr>
+                <a:t>ra</a:t>
+              </a:r>
+              <a:r>
+                <a:rPr lang="en-GB" sz="1050" b="1" dirty="0">
+                  <a:latin typeface="Harlow Solid Italic" panose="04030604020F02020D02" pitchFamily="82" charset="0"/>
+                </a:rPr>
+                <a:t> </a:t>
+              </a:r>
+              <a:r>
+                <a:rPr lang="en-GB" sz="1050" b="1" dirty="0" err="1">
+                  <a:latin typeface="Harlow Solid Italic" panose="04030604020F02020D02" pitchFamily="82" charset="0"/>
+                </a:rPr>
+                <a:t>aigpmb</a:t>
+              </a:r>
+              <a:r>
+                <a:rPr lang="en-GB" sz="1050" b="1" dirty="0">
+                  <a:latin typeface="Harlow Solid Italic" panose="04030604020F02020D02" pitchFamily="82" charset="0"/>
+                </a:rPr>
+                <a:t> </a:t>
+              </a:r>
+              <a:r>
+                <a:rPr lang="en-GB" sz="1050" b="1" dirty="0" err="1">
+                  <a:latin typeface="Harlow Solid Italic" panose="04030604020F02020D02" pitchFamily="82" charset="0"/>
+                </a:rPr>
+                <a:t>apmi</a:t>
+              </a:r>
+              <a:r>
+                <a:rPr lang="en-GB" sz="1050" b="1" dirty="0">
+                  <a:latin typeface="Harlow Solid Italic" panose="04030604020F02020D02" pitchFamily="82" charset="0"/>
+                </a:rPr>
+                <a:t> </a:t>
+              </a:r>
+              <a:r>
+                <a:rPr lang="en-GB" sz="1050" b="1" dirty="0" err="1">
+                  <a:latin typeface="Harlow Solid Italic" panose="04030604020F02020D02" pitchFamily="82" charset="0"/>
+                </a:rPr>
+                <a:t>aptil</a:t>
+              </a:r>
+              <a:r>
+                <a:rPr lang="en-GB" sz="1050" b="1" dirty="0">
+                  <a:latin typeface="Harlow Solid Italic" panose="04030604020F02020D02" pitchFamily="82" charset="0"/>
+                </a:rPr>
+                <a:t> </a:t>
+              </a:r>
+              <a:r>
+                <a:rPr lang="en-GB" sz="1050" b="1" dirty="0" err="1">
+                  <a:latin typeface="Harlow Solid Italic" panose="04030604020F02020D02" pitchFamily="82" charset="0"/>
+                </a:rPr>
+                <a:t>tio</a:t>
+              </a:r>
+              <a:endParaRPr lang="en-GB" sz="1050" b="1" dirty="0">
+                <a:latin typeface="Harlow Solid Italic" panose="04030604020F02020D02" pitchFamily="82" charset="0"/>
+              </a:endParaRPr>
+            </a:p>
+          </p:txBody>
+        </p:sp>
+      </p:grpSp>
+      <p:grpSp>
+        <p:nvGrpSpPr>
+          <p:cNvPr id="52" name="Group 51">
+            <a:extLst>
+              <a:ext uri="{FF2B5EF4-FFF2-40B4-BE49-F238E27FC236}">
+                <a16:creationId xmlns:a16="http://schemas.microsoft.com/office/drawing/2014/main" id="{33137CE6-09E2-F4F3-5E5E-C80E96EB899E}"/>
+              </a:ext>
+            </a:extLst>
+          </p:cNvPr>
+          <p:cNvGrpSpPr/>
+          <p:nvPr/>
+        </p:nvGrpSpPr>
+        <p:grpSpPr>
+          <a:xfrm>
+            <a:off x="324996" y="4938710"/>
+            <a:ext cx="4750676" cy="508830"/>
+            <a:chOff x="399393" y="4867258"/>
+            <a:chExt cx="4750676" cy="508830"/>
+          </a:xfrm>
+        </p:grpSpPr>
+        <p:sp>
+          <p:nvSpPr>
+            <p:cNvPr id="26" name="Rectangle: Rounded Corners 25">
+              <a:extLst>
+                <a:ext uri="{FF2B5EF4-FFF2-40B4-BE49-F238E27FC236}">
+                  <a16:creationId xmlns:a16="http://schemas.microsoft.com/office/drawing/2014/main" id="{513D16BA-8A14-5225-4B54-F6DF4A9AD2A5}"/>
+                </a:ext>
+              </a:extLst>
+            </p:cNvPr>
+            <p:cNvSpPr/>
+            <p:nvPr/>
+          </p:nvSpPr>
+          <p:spPr>
+            <a:xfrm>
+              <a:off x="399393" y="4867258"/>
+              <a:ext cx="4750676" cy="508830"/>
+            </a:xfrm>
+            <a:prstGeom prst="roundRect">
+              <a:avLst/>
+            </a:prstGeom>
+            <a:noFill/>
+            <a:ln w="3175">
+              <a:solidFill>
+                <a:schemeClr val="tx1"/>
+              </a:solidFill>
+            </a:ln>
+          </p:spPr>
+          <p:style>
+            <a:lnRef idx="2">
+              <a:schemeClr val="accent1">
+                <a:shade val="15000"/>
+              </a:schemeClr>
+            </a:lnRef>
+            <a:fillRef idx="1">
+              <a:schemeClr val="accent1"/>
+            </a:fillRef>
+            <a:effectRef idx="0">
+              <a:schemeClr val="accent1"/>
+            </a:effectRef>
+            <a:fontRef idx="minor">
+              <a:schemeClr val="lt1"/>
+            </a:fontRef>
+          </p:style>
+          <p:txBody>
+            <a:bodyPr rtlCol="0" anchor="ctr"/>
+            <a:lstStyle/>
+            <a:p>
+              <a:pPr algn="ctr"/>
+              <a:endParaRPr lang="en-GB" dirty="0"/>
+            </a:p>
+          </p:txBody>
+        </p:sp>
+        <p:sp>
+          <p:nvSpPr>
+            <p:cNvPr id="36" name="Oval 35">
+              <a:extLst>
+                <a:ext uri="{FF2B5EF4-FFF2-40B4-BE49-F238E27FC236}">
+                  <a16:creationId xmlns:a16="http://schemas.microsoft.com/office/drawing/2014/main" id="{B197301A-46CD-2EEC-DC25-090B6E8AEC75}"/>
+                </a:ext>
+              </a:extLst>
+            </p:cNvPr>
+            <p:cNvSpPr/>
+            <p:nvPr/>
+          </p:nvSpPr>
+          <p:spPr>
+            <a:xfrm>
+              <a:off x="4709857" y="4941673"/>
+              <a:ext cx="360000" cy="360000"/>
+            </a:xfrm>
+            <a:prstGeom prst="ellipse">
+              <a:avLst/>
+            </a:prstGeom>
+            <a:solidFill>
+              <a:srgbClr val="156082">
+                <a:alpha val="50196"/>
+              </a:srgbClr>
+            </a:solidFill>
+          </p:spPr>
+          <p:style>
+            <a:lnRef idx="2">
+              <a:schemeClr val="accent1">
+                <a:shade val="15000"/>
+              </a:schemeClr>
+            </a:lnRef>
+            <a:fillRef idx="1">
+              <a:schemeClr val="accent1"/>
+            </a:fillRef>
+            <a:effectRef idx="0">
+              <a:schemeClr val="accent1"/>
+            </a:effectRef>
+            <a:fontRef idx="minor">
+              <a:schemeClr val="lt1"/>
+            </a:fontRef>
+          </p:style>
+          <p:txBody>
+            <a:bodyPr rtlCol="0" anchor="ctr"/>
+            <a:lstStyle/>
+            <a:p>
+              <a:pPr algn="ctr"/>
+              <a:endParaRPr lang="en-GB" dirty="0"/>
+            </a:p>
+          </p:txBody>
+        </p:sp>
+        <p:sp>
+          <p:nvSpPr>
+            <p:cNvPr id="41" name="Oval 40">
+              <a:extLst>
+                <a:ext uri="{FF2B5EF4-FFF2-40B4-BE49-F238E27FC236}">
+                  <a16:creationId xmlns:a16="http://schemas.microsoft.com/office/drawing/2014/main" id="{3CF10BF9-1E9D-C48F-7C19-6A5C4396E7A0}"/>
+                </a:ext>
+              </a:extLst>
+            </p:cNvPr>
+            <p:cNvSpPr/>
+            <p:nvPr/>
+          </p:nvSpPr>
+          <p:spPr>
+            <a:xfrm>
+              <a:off x="4288203" y="4941673"/>
+              <a:ext cx="360000" cy="360000"/>
+            </a:xfrm>
+            <a:prstGeom prst="ellipse">
+              <a:avLst/>
+            </a:prstGeom>
+            <a:solidFill>
+              <a:srgbClr val="156082">
+                <a:alpha val="50196"/>
+              </a:srgbClr>
+            </a:solidFill>
+          </p:spPr>
+          <p:style>
+            <a:lnRef idx="2">
+              <a:schemeClr val="accent1">
+                <a:shade val="15000"/>
+              </a:schemeClr>
+            </a:lnRef>
+            <a:fillRef idx="1">
+              <a:schemeClr val="accent1"/>
+            </a:fillRef>
+            <a:effectRef idx="0">
+              <a:schemeClr val="accent1"/>
+            </a:effectRef>
+            <a:fontRef idx="minor">
+              <a:schemeClr val="lt1"/>
+            </a:fontRef>
+          </p:style>
+          <p:txBody>
+            <a:bodyPr rtlCol="0" anchor="ctr"/>
+            <a:lstStyle/>
+            <a:p>
+              <a:pPr algn="ctr"/>
+              <a:endParaRPr lang="en-GB" dirty="0"/>
+            </a:p>
+          </p:txBody>
+        </p:sp>
+        <p:sp>
+          <p:nvSpPr>
+            <p:cNvPr id="42" name="Oval 41">
+              <a:extLst>
+                <a:ext uri="{FF2B5EF4-FFF2-40B4-BE49-F238E27FC236}">
+                  <a16:creationId xmlns:a16="http://schemas.microsoft.com/office/drawing/2014/main" id="{04613816-CA6E-C507-0A99-5A897DC9DEC4}"/>
+                </a:ext>
+              </a:extLst>
+            </p:cNvPr>
+            <p:cNvSpPr/>
+            <p:nvPr/>
+          </p:nvSpPr>
+          <p:spPr>
+            <a:xfrm>
+              <a:off x="3866551" y="4941673"/>
+              <a:ext cx="360000" cy="360000"/>
+            </a:xfrm>
+            <a:prstGeom prst="ellipse">
+              <a:avLst/>
+            </a:prstGeom>
+            <a:solidFill>
+              <a:srgbClr val="156082">
+                <a:alpha val="50196"/>
+              </a:srgbClr>
+            </a:solidFill>
+          </p:spPr>
+          <p:style>
+            <a:lnRef idx="2">
+              <a:schemeClr val="accent1">
+                <a:shade val="15000"/>
+              </a:schemeClr>
+            </a:lnRef>
+            <a:fillRef idx="1">
+              <a:schemeClr val="accent1"/>
+            </a:fillRef>
+            <a:effectRef idx="0">
+              <a:schemeClr val="accent1"/>
+            </a:effectRef>
+            <a:fontRef idx="minor">
+              <a:schemeClr val="lt1"/>
+            </a:fontRef>
+          </p:style>
+          <p:txBody>
+            <a:bodyPr rtlCol="0" anchor="ctr"/>
+            <a:lstStyle/>
+            <a:p>
+              <a:pPr algn="ctr"/>
+              <a:endParaRPr lang="en-GB" dirty="0"/>
+            </a:p>
+          </p:txBody>
+        </p:sp>
+        <p:sp>
+          <p:nvSpPr>
+            <p:cNvPr id="43" name="Oval 42">
+              <a:extLst>
+                <a:ext uri="{FF2B5EF4-FFF2-40B4-BE49-F238E27FC236}">
+                  <a16:creationId xmlns:a16="http://schemas.microsoft.com/office/drawing/2014/main" id="{6FBF276D-25CC-07C4-66BC-5DA2B6EF7A57}"/>
+                </a:ext>
+              </a:extLst>
+            </p:cNvPr>
+            <p:cNvSpPr/>
+            <p:nvPr/>
+          </p:nvSpPr>
+          <p:spPr>
+            <a:xfrm>
+              <a:off x="3444899" y="4941673"/>
+              <a:ext cx="360000" cy="360000"/>
+            </a:xfrm>
+            <a:prstGeom prst="ellipse">
+              <a:avLst/>
+            </a:prstGeom>
+            <a:solidFill>
+              <a:srgbClr val="156082">
+                <a:alpha val="50196"/>
+              </a:srgbClr>
+            </a:solidFill>
+          </p:spPr>
+          <p:style>
+            <a:lnRef idx="2">
+              <a:schemeClr val="accent1">
+                <a:shade val="15000"/>
+              </a:schemeClr>
+            </a:lnRef>
+            <a:fillRef idx="1">
+              <a:schemeClr val="accent1"/>
+            </a:fillRef>
+            <a:effectRef idx="0">
+              <a:schemeClr val="accent1"/>
+            </a:effectRef>
+            <a:fontRef idx="minor">
+              <a:schemeClr val="lt1"/>
+            </a:fontRef>
+          </p:style>
+          <p:txBody>
+            <a:bodyPr rtlCol="0" anchor="ctr"/>
+            <a:lstStyle/>
+            <a:p>
+              <a:pPr algn="ctr"/>
+              <a:endParaRPr lang="en-GB" dirty="0"/>
+            </a:p>
+          </p:txBody>
+        </p:sp>
+        <p:sp>
+          <p:nvSpPr>
+            <p:cNvPr id="44" name="Oval 43">
+              <a:extLst>
+                <a:ext uri="{FF2B5EF4-FFF2-40B4-BE49-F238E27FC236}">
+                  <a16:creationId xmlns:a16="http://schemas.microsoft.com/office/drawing/2014/main" id="{EE682876-20B8-ABCD-5BAF-B4060C775653}"/>
+                </a:ext>
+              </a:extLst>
+            </p:cNvPr>
+            <p:cNvSpPr/>
+            <p:nvPr/>
+          </p:nvSpPr>
+          <p:spPr>
+            <a:xfrm>
+              <a:off x="3023247" y="4941673"/>
+              <a:ext cx="360000" cy="360000"/>
+            </a:xfrm>
+            <a:prstGeom prst="ellipse">
+              <a:avLst/>
+            </a:prstGeom>
+            <a:solidFill>
+              <a:srgbClr val="156082">
+                <a:alpha val="50196"/>
+              </a:srgbClr>
+            </a:solidFill>
+          </p:spPr>
+          <p:style>
+            <a:lnRef idx="2">
+              <a:schemeClr val="accent1">
+                <a:shade val="15000"/>
+              </a:schemeClr>
+            </a:lnRef>
+            <a:fillRef idx="1">
+              <a:schemeClr val="accent1"/>
+            </a:fillRef>
+            <a:effectRef idx="0">
+              <a:schemeClr val="accent1"/>
+            </a:effectRef>
+            <a:fontRef idx="minor">
+              <a:schemeClr val="lt1"/>
+            </a:fontRef>
+          </p:style>
+          <p:txBody>
+            <a:bodyPr rtlCol="0" anchor="ctr"/>
+            <a:lstStyle/>
+            <a:p>
+              <a:pPr algn="ctr"/>
+              <a:endParaRPr lang="en-GB" dirty="0"/>
+            </a:p>
+          </p:txBody>
+        </p:sp>
+        <p:sp>
+          <p:nvSpPr>
+            <p:cNvPr id="45" name="Oval 44">
+              <a:extLst>
+                <a:ext uri="{FF2B5EF4-FFF2-40B4-BE49-F238E27FC236}">
+                  <a16:creationId xmlns:a16="http://schemas.microsoft.com/office/drawing/2014/main" id="{5B48084B-D39C-F3D2-AB9C-6954F8BE119D}"/>
+                </a:ext>
+              </a:extLst>
+            </p:cNvPr>
+            <p:cNvSpPr/>
+            <p:nvPr/>
+          </p:nvSpPr>
+          <p:spPr>
+            <a:xfrm>
+              <a:off x="2601595" y="4941673"/>
+              <a:ext cx="360000" cy="360000"/>
+            </a:xfrm>
+            <a:prstGeom prst="ellipse">
+              <a:avLst/>
+            </a:prstGeom>
+            <a:solidFill>
+              <a:srgbClr val="156082">
+                <a:alpha val="50196"/>
+              </a:srgbClr>
+            </a:solidFill>
+          </p:spPr>
+          <p:style>
+            <a:lnRef idx="2">
+              <a:schemeClr val="accent1">
+                <a:shade val="15000"/>
+              </a:schemeClr>
+            </a:lnRef>
+            <a:fillRef idx="1">
+              <a:schemeClr val="accent1"/>
+            </a:fillRef>
+            <a:effectRef idx="0">
+              <a:schemeClr val="accent1"/>
+            </a:effectRef>
+            <a:fontRef idx="minor">
+              <a:schemeClr val="lt1"/>
+            </a:fontRef>
+          </p:style>
+          <p:txBody>
+            <a:bodyPr rtlCol="0" anchor="ctr"/>
+            <a:lstStyle/>
+            <a:p>
+              <a:pPr algn="ctr"/>
+              <a:endParaRPr lang="en-GB" dirty="0"/>
+            </a:p>
+          </p:txBody>
+        </p:sp>
+        <p:sp>
+          <p:nvSpPr>
+            <p:cNvPr id="46" name="Oval 45">
+              <a:extLst>
+                <a:ext uri="{FF2B5EF4-FFF2-40B4-BE49-F238E27FC236}">
+                  <a16:creationId xmlns:a16="http://schemas.microsoft.com/office/drawing/2014/main" id="{B56CDBF2-6DF8-447C-B4FD-767D4EC4DFD0}"/>
+                </a:ext>
+              </a:extLst>
+            </p:cNvPr>
+            <p:cNvSpPr/>
+            <p:nvPr/>
+          </p:nvSpPr>
+          <p:spPr>
+            <a:xfrm>
+              <a:off x="2179943" y="4941673"/>
+              <a:ext cx="360000" cy="360000"/>
+            </a:xfrm>
+            <a:prstGeom prst="ellipse">
+              <a:avLst/>
+            </a:prstGeom>
+            <a:solidFill>
+              <a:srgbClr val="156082">
+                <a:alpha val="50196"/>
+              </a:srgbClr>
+            </a:solidFill>
+          </p:spPr>
+          <p:style>
+            <a:lnRef idx="2">
+              <a:schemeClr val="accent1">
+                <a:shade val="15000"/>
+              </a:schemeClr>
+            </a:lnRef>
+            <a:fillRef idx="1">
+              <a:schemeClr val="accent1"/>
+            </a:fillRef>
+            <a:effectRef idx="0">
+              <a:schemeClr val="accent1"/>
+            </a:effectRef>
+            <a:fontRef idx="minor">
+              <a:schemeClr val="lt1"/>
+            </a:fontRef>
+          </p:style>
+          <p:txBody>
+            <a:bodyPr rtlCol="0" anchor="ctr"/>
+            <a:lstStyle/>
+            <a:p>
+              <a:pPr algn="ctr"/>
+              <a:endParaRPr lang="en-GB" dirty="0"/>
+            </a:p>
+          </p:txBody>
+        </p:sp>
+        <p:sp>
+          <p:nvSpPr>
+            <p:cNvPr id="47" name="Oval 46">
+              <a:extLst>
+                <a:ext uri="{FF2B5EF4-FFF2-40B4-BE49-F238E27FC236}">
+                  <a16:creationId xmlns:a16="http://schemas.microsoft.com/office/drawing/2014/main" id="{4EB78D45-DB05-A5E5-FB18-8A76246E50E5}"/>
+                </a:ext>
+              </a:extLst>
+            </p:cNvPr>
+            <p:cNvSpPr/>
+            <p:nvPr/>
+          </p:nvSpPr>
+          <p:spPr>
+            <a:xfrm>
+              <a:off x="1758291" y="4941673"/>
+              <a:ext cx="360000" cy="360000"/>
+            </a:xfrm>
+            <a:prstGeom prst="ellipse">
+              <a:avLst/>
+            </a:prstGeom>
+            <a:solidFill>
+              <a:srgbClr val="156082">
+                <a:alpha val="85098"/>
+              </a:srgbClr>
+            </a:solidFill>
+          </p:spPr>
+          <p:style>
+            <a:lnRef idx="2">
+              <a:schemeClr val="accent1">
+                <a:shade val="15000"/>
+              </a:schemeClr>
+            </a:lnRef>
+            <a:fillRef idx="1">
+              <a:schemeClr val="accent1"/>
+            </a:fillRef>
+            <a:effectRef idx="0">
+              <a:schemeClr val="accent1"/>
+            </a:effectRef>
+            <a:fontRef idx="minor">
+              <a:schemeClr val="lt1"/>
+            </a:fontRef>
+          </p:style>
+          <p:txBody>
+            <a:bodyPr rtlCol="0" anchor="ctr"/>
+            <a:lstStyle/>
+            <a:p>
+              <a:pPr algn="ctr"/>
+              <a:endParaRPr lang="en-GB" dirty="0"/>
+            </a:p>
+          </p:txBody>
+        </p:sp>
+        <p:sp>
+          <p:nvSpPr>
+            <p:cNvPr id="48" name="Oval 47">
+              <a:extLst>
+                <a:ext uri="{FF2B5EF4-FFF2-40B4-BE49-F238E27FC236}">
+                  <a16:creationId xmlns:a16="http://schemas.microsoft.com/office/drawing/2014/main" id="{EA60CE98-5AC5-A487-A41C-288E710A973E}"/>
+                </a:ext>
+              </a:extLst>
+            </p:cNvPr>
+            <p:cNvSpPr/>
+            <p:nvPr/>
+          </p:nvSpPr>
+          <p:spPr>
+            <a:xfrm>
+              <a:off x="1336639" y="4941673"/>
+              <a:ext cx="360000" cy="360000"/>
+            </a:xfrm>
+            <a:prstGeom prst="ellipse">
+              <a:avLst/>
+            </a:prstGeom>
+            <a:solidFill>
+              <a:srgbClr val="156082">
+                <a:alpha val="50196"/>
+              </a:srgbClr>
+            </a:solidFill>
+          </p:spPr>
+          <p:style>
+            <a:lnRef idx="2">
+              <a:schemeClr val="accent1">
+                <a:shade val="15000"/>
+              </a:schemeClr>
+            </a:lnRef>
+            <a:fillRef idx="1">
+              <a:schemeClr val="accent1"/>
+            </a:fillRef>
+            <a:effectRef idx="0">
+              <a:schemeClr val="accent1"/>
+            </a:effectRef>
+            <a:fontRef idx="minor">
+              <a:schemeClr val="lt1"/>
+            </a:fontRef>
+          </p:style>
+          <p:txBody>
+            <a:bodyPr rtlCol="0" anchor="ctr"/>
+            <a:lstStyle/>
+            <a:p>
+              <a:pPr algn="ctr"/>
+              <a:endParaRPr lang="en-GB" dirty="0"/>
+            </a:p>
+          </p:txBody>
+        </p:sp>
+        <p:sp>
+          <p:nvSpPr>
+            <p:cNvPr id="49" name="Oval 48">
+              <a:extLst>
+                <a:ext uri="{FF2B5EF4-FFF2-40B4-BE49-F238E27FC236}">
+                  <a16:creationId xmlns:a16="http://schemas.microsoft.com/office/drawing/2014/main" id="{CB664352-05E1-CF89-EC58-FCE579C629AF}"/>
+                </a:ext>
+              </a:extLst>
+            </p:cNvPr>
+            <p:cNvSpPr/>
+            <p:nvPr/>
+          </p:nvSpPr>
+          <p:spPr>
+            <a:xfrm>
+              <a:off x="914987" y="4941673"/>
+              <a:ext cx="360000" cy="360000"/>
+            </a:xfrm>
+            <a:prstGeom prst="ellipse">
+              <a:avLst/>
+            </a:prstGeom>
+            <a:solidFill>
+              <a:srgbClr val="156082">
+                <a:alpha val="50196"/>
+              </a:srgbClr>
+            </a:solidFill>
+          </p:spPr>
+          <p:style>
+            <a:lnRef idx="2">
+              <a:schemeClr val="accent1">
+                <a:shade val="15000"/>
+              </a:schemeClr>
+            </a:lnRef>
+            <a:fillRef idx="1">
+              <a:schemeClr val="accent1"/>
+            </a:fillRef>
+            <a:effectRef idx="0">
+              <a:schemeClr val="accent1"/>
+            </a:effectRef>
+            <a:fontRef idx="minor">
+              <a:schemeClr val="lt1"/>
+            </a:fontRef>
+          </p:style>
+          <p:txBody>
+            <a:bodyPr rtlCol="0" anchor="ctr"/>
+            <a:lstStyle/>
+            <a:p>
+              <a:pPr algn="ctr"/>
+              <a:endParaRPr lang="en-GB" dirty="0"/>
+            </a:p>
+          </p:txBody>
+        </p:sp>
+        <p:sp>
+          <p:nvSpPr>
+            <p:cNvPr id="50" name="Oval 49">
+              <a:extLst>
+                <a:ext uri="{FF2B5EF4-FFF2-40B4-BE49-F238E27FC236}">
+                  <a16:creationId xmlns:a16="http://schemas.microsoft.com/office/drawing/2014/main" id="{EDDCA17B-8D38-B3EC-6FD9-2D5B7C9E49D6}"/>
+                </a:ext>
+              </a:extLst>
+            </p:cNvPr>
+            <p:cNvSpPr/>
+            <p:nvPr/>
+          </p:nvSpPr>
+          <p:spPr>
+            <a:xfrm>
+              <a:off x="493335" y="4941673"/>
+              <a:ext cx="360000" cy="360000"/>
+            </a:xfrm>
+            <a:prstGeom prst="ellipse">
+              <a:avLst/>
+            </a:prstGeom>
+            <a:solidFill>
+              <a:srgbClr val="156082">
+                <a:alpha val="50196"/>
+              </a:srgbClr>
+            </a:solidFill>
+          </p:spPr>
+          <p:style>
+            <a:lnRef idx="2">
+              <a:schemeClr val="accent1">
+                <a:shade val="15000"/>
+              </a:schemeClr>
+            </a:lnRef>
+            <a:fillRef idx="1">
+              <a:schemeClr val="accent1"/>
+            </a:fillRef>
+            <a:effectRef idx="0">
+              <a:schemeClr val="accent1"/>
+            </a:effectRef>
+            <a:fontRef idx="minor">
+              <a:schemeClr val="lt1"/>
+            </a:fontRef>
+          </p:style>
+          <p:txBody>
+            <a:bodyPr rtlCol="0" anchor="ctr"/>
+            <a:lstStyle/>
+            <a:p>
+              <a:pPr algn="ctr"/>
+              <a:endParaRPr lang="en-GB" dirty="0"/>
+            </a:p>
+          </p:txBody>
+        </p:sp>
+      </p:grpSp>
+      <p:sp>
+        <p:nvSpPr>
+          <p:cNvPr id="31" name="Rectangle 30">
+            <a:extLst>
+              <a:ext uri="{FF2B5EF4-FFF2-40B4-BE49-F238E27FC236}">
+                <a16:creationId xmlns:a16="http://schemas.microsoft.com/office/drawing/2014/main" id="{AEF51E76-6049-F269-7E1A-187E0E421568}"/>
+              </a:ext>
+            </a:extLst>
+          </p:cNvPr>
+          <p:cNvSpPr/>
+          <p:nvPr/>
+        </p:nvSpPr>
+        <p:spPr>
+          <a:xfrm>
+            <a:off x="-2186152" y="1114097"/>
+            <a:ext cx="2186147" cy="4761186"/>
+          </a:xfrm>
+          <a:prstGeom prst="rect">
+            <a:avLst/>
+          </a:prstGeom>
+          <a:solidFill>
+            <a:srgbClr val="262626"/>
+          </a:solidFill>
+          <a:ln>
+            <a:noFill/>
+          </a:ln>
+        </p:spPr>
+        <p:style>
+          <a:lnRef idx="2">
+            <a:schemeClr val="accent1">
+              <a:shade val="15000"/>
+            </a:schemeClr>
+          </a:lnRef>
+          <a:fillRef idx="1">
+            <a:schemeClr val="accent1"/>
+          </a:fillRef>
+          <a:effectRef idx="0">
+            <a:schemeClr val="accent1"/>
+          </a:effectRef>
+          <a:fontRef idx="minor">
+            <a:schemeClr val="lt1"/>
+          </a:fontRef>
+        </p:style>
+        <p:txBody>
+          <a:bodyPr rtlCol="0" anchor="ctr"/>
+          <a:lstStyle/>
+          <a:p>
+            <a:pPr algn="ctr"/>
+            <a:endParaRPr lang="en-GB"/>
+          </a:p>
+        </p:txBody>
+      </p:sp>
+      <p:sp>
+        <p:nvSpPr>
+          <p:cNvPr id="33" name="Rectangle 32">
+            <a:extLst>
+              <a:ext uri="{FF2B5EF4-FFF2-40B4-BE49-F238E27FC236}">
+                <a16:creationId xmlns:a16="http://schemas.microsoft.com/office/drawing/2014/main" id="{639EDD16-EA71-26E1-EA51-08AAA83BE207}"/>
+              </a:ext>
+            </a:extLst>
+          </p:cNvPr>
+          <p:cNvSpPr/>
+          <p:nvPr/>
+        </p:nvSpPr>
+        <p:spPr>
+          <a:xfrm>
+            <a:off x="5416044" y="1545021"/>
+            <a:ext cx="2186147" cy="3843680"/>
+          </a:xfrm>
+          <a:prstGeom prst="rect">
+            <a:avLst/>
+          </a:prstGeom>
+          <a:solidFill>
+            <a:srgbClr val="262626"/>
+          </a:solidFill>
+          <a:ln>
+            <a:noFill/>
+          </a:ln>
+        </p:spPr>
+        <p:style>
+          <a:lnRef idx="2">
+            <a:schemeClr val="accent1">
+              <a:shade val="15000"/>
+            </a:schemeClr>
+          </a:lnRef>
+          <a:fillRef idx="1">
+            <a:schemeClr val="accent1"/>
+          </a:fillRef>
+          <a:effectRef idx="0">
+            <a:schemeClr val="accent1"/>
+          </a:effectRef>
+          <a:fontRef idx="minor">
+            <a:schemeClr val="lt1"/>
+          </a:fontRef>
+        </p:style>
+        <p:txBody>
+          <a:bodyPr rtlCol="0" anchor="ctr"/>
+          <a:lstStyle/>
+          <a:p>
+            <a:pPr algn="ctr"/>
+            <a:endParaRPr lang="en-GB"/>
+          </a:p>
+        </p:txBody>
+      </p:sp>
+      <p:sp>
+        <p:nvSpPr>
+          <p:cNvPr id="34" name="TextBox 33">
+            <a:extLst>
+              <a:ext uri="{FF2B5EF4-FFF2-40B4-BE49-F238E27FC236}">
+                <a16:creationId xmlns:a16="http://schemas.microsoft.com/office/drawing/2014/main" id="{3F860864-B31B-2C51-ECC8-F1DB42CB86B3}"/>
+              </a:ext>
+            </a:extLst>
+          </p:cNvPr>
+          <p:cNvSpPr txBox="1"/>
+          <p:nvPr/>
+        </p:nvSpPr>
+        <p:spPr>
+          <a:xfrm>
+            <a:off x="1055662" y="486774"/>
+            <a:ext cx="3289344" cy="461665"/>
+          </a:xfrm>
+          <a:prstGeom prst="rect">
+            <a:avLst/>
+          </a:prstGeom>
+          <a:noFill/>
+        </p:spPr>
+        <p:txBody>
+          <a:bodyPr wrap="square" rtlCol="0">
+            <a:spAutoFit/>
+          </a:bodyPr>
+          <a:lstStyle/>
+          <a:p>
+            <a:pPr algn="ctr"/>
+            <a:r>
+              <a:rPr lang="en-GB" sz="2400" b="1" dirty="0"/>
+              <a:t>Gallery Design</a:t>
+            </a:r>
+          </a:p>
+        </p:txBody>
+      </p:sp>
+      <p:sp>
+        <p:nvSpPr>
+          <p:cNvPr id="35" name="TextBox 34">
+            <a:extLst>
+              <a:ext uri="{FF2B5EF4-FFF2-40B4-BE49-F238E27FC236}">
+                <a16:creationId xmlns:a16="http://schemas.microsoft.com/office/drawing/2014/main" id="{9551CFCE-0DFF-77E4-2033-D7F3FE7C6903}"/>
+              </a:ext>
+            </a:extLst>
+          </p:cNvPr>
+          <p:cNvSpPr txBox="1"/>
+          <p:nvPr/>
+        </p:nvSpPr>
+        <p:spPr>
+          <a:xfrm>
+            <a:off x="126125" y="5741506"/>
+            <a:ext cx="5023944" cy="1384995"/>
+          </a:xfrm>
+          <a:prstGeom prst="rect">
+            <a:avLst/>
+          </a:prstGeom>
+          <a:noFill/>
+        </p:spPr>
+        <p:txBody>
+          <a:bodyPr wrap="square" rtlCol="0">
+            <a:spAutoFit/>
+          </a:bodyPr>
+          <a:lstStyle/>
+          <a:p>
+            <a:r>
+              <a:rPr lang="en-GB" sz="1200" dirty="0"/>
+              <a:t>All photos in polaroid containers. Slowly scrolling across the screen until the user hovers/taps. If one is clicked it zooms to fill whole screen and removes filter</a:t>
+            </a:r>
+          </a:p>
+          <a:p>
+            <a:r>
+              <a:rPr lang="en-GB" sz="1200" dirty="0"/>
+              <a:t>Has floating indicator to show how many photos and where in list you are.</a:t>
+            </a:r>
+          </a:p>
+          <a:p>
+            <a:r>
+              <a:rPr lang="en-GB" sz="1200" dirty="0"/>
+              <a:t>Ideally on desktop it would be clickable to move to the clicked indicator and on mobile have the whole carousel be </a:t>
+            </a:r>
+            <a:r>
+              <a:rPr lang="en-GB" sz="1200" dirty="0" err="1"/>
+              <a:t>swipeable</a:t>
+            </a:r>
+            <a:r>
+              <a:rPr lang="en-GB" sz="1200" dirty="0"/>
+              <a:t> to allow for quick movement through the photos</a:t>
+            </a:r>
+          </a:p>
+        </p:txBody>
+      </p:sp>
+    </p:spTree>
+    <p:extLst>
+      <p:ext uri="{BB962C8B-B14F-4D97-AF65-F5344CB8AC3E}">
+        <p14:creationId xmlns:p14="http://schemas.microsoft.com/office/powerpoint/2010/main" val="29421466"/>
+      </p:ext>
+    </p:extLst>
+  </p:cSld>
+  <p:clrMapOvr>
+    <a:masterClrMapping/>
+  </p:clrMapOvr>
+</p:sld>
+</file>
+
 <file path=ppt/theme/theme1.xml><?xml version="1.0" encoding="utf-8"?>
 <a:theme xmlns:a="http://schemas.openxmlformats.org/drawingml/2006/main" name="Office Theme">
   <a:themeElements>

</xml_diff>